<commit_message>
implement different run for different seed + changed plots performance
</commit_message>
<xml_diff>
--- a/C1_documentation/analysis_noise_scenarios.pptx
+++ b/C1_documentation/analysis_noise_scenarios.pptx
@@ -6,9 +6,8 @@
   </p:sldMasterIdLst>
   <p:sldIdLst>
     <p:sldId id="256" r:id="rId2"/>
-    <p:sldId id="259" r:id="rId3"/>
-    <p:sldId id="260" r:id="rId4"/>
-    <p:sldId id="258" r:id="rId5"/>
+    <p:sldId id="260" r:id="rId3"/>
+    <p:sldId id="258" r:id="rId4"/>
   </p:sldIdLst>
   <p:sldSz cx="12192000" cy="6858000"/>
   <p:notesSz cx="6858000" cy="9144000"/>
@@ -246,7 +245,7 @@
           <a:p>
             <a:fld id="{FCCADD97-FA4F-4F85-9ADA-B95C63D71438}" type="datetimeFigureOut">
               <a:rPr lang="de-CH" smtClean="0"/>
-              <a:t>19.03.2025</a:t>
+              <a:t>13.05.2025</a:t>
             </a:fld>
             <a:endParaRPr lang="de-CH"/>
           </a:p>
@@ -416,7 +415,7 @@
           <a:p>
             <a:fld id="{FCCADD97-FA4F-4F85-9ADA-B95C63D71438}" type="datetimeFigureOut">
               <a:rPr lang="de-CH" smtClean="0"/>
-              <a:t>19.03.2025</a:t>
+              <a:t>13.05.2025</a:t>
             </a:fld>
             <a:endParaRPr lang="de-CH"/>
           </a:p>
@@ -596,7 +595,7 @@
           <a:p>
             <a:fld id="{FCCADD97-FA4F-4F85-9ADA-B95C63D71438}" type="datetimeFigureOut">
               <a:rPr lang="de-CH" smtClean="0"/>
-              <a:t>19.03.2025</a:t>
+              <a:t>13.05.2025</a:t>
             </a:fld>
             <a:endParaRPr lang="de-CH"/>
           </a:p>
@@ -766,7 +765,7 @@
           <a:p>
             <a:fld id="{FCCADD97-FA4F-4F85-9ADA-B95C63D71438}" type="datetimeFigureOut">
               <a:rPr lang="de-CH" smtClean="0"/>
-              <a:t>19.03.2025</a:t>
+              <a:t>13.05.2025</a:t>
             </a:fld>
             <a:endParaRPr lang="de-CH"/>
           </a:p>
@@ -1012,7 +1011,7 @@
           <a:p>
             <a:fld id="{FCCADD97-FA4F-4F85-9ADA-B95C63D71438}" type="datetimeFigureOut">
               <a:rPr lang="de-CH" smtClean="0"/>
-              <a:t>19.03.2025</a:t>
+              <a:t>13.05.2025</a:t>
             </a:fld>
             <a:endParaRPr lang="de-CH"/>
           </a:p>
@@ -1244,7 +1243,7 @@
           <a:p>
             <a:fld id="{FCCADD97-FA4F-4F85-9ADA-B95C63D71438}" type="datetimeFigureOut">
               <a:rPr lang="de-CH" smtClean="0"/>
-              <a:t>19.03.2025</a:t>
+              <a:t>13.05.2025</a:t>
             </a:fld>
             <a:endParaRPr lang="de-CH"/>
           </a:p>
@@ -1611,7 +1610,7 @@
           <a:p>
             <a:fld id="{FCCADD97-FA4F-4F85-9ADA-B95C63D71438}" type="datetimeFigureOut">
               <a:rPr lang="de-CH" smtClean="0"/>
-              <a:t>19.03.2025</a:t>
+              <a:t>13.05.2025</a:t>
             </a:fld>
             <a:endParaRPr lang="de-CH"/>
           </a:p>
@@ -1729,7 +1728,7 @@
           <a:p>
             <a:fld id="{FCCADD97-FA4F-4F85-9ADA-B95C63D71438}" type="datetimeFigureOut">
               <a:rPr lang="de-CH" smtClean="0"/>
-              <a:t>19.03.2025</a:t>
+              <a:t>13.05.2025</a:t>
             </a:fld>
             <a:endParaRPr lang="de-CH"/>
           </a:p>
@@ -1824,7 +1823,7 @@
           <a:p>
             <a:fld id="{FCCADD97-FA4F-4F85-9ADA-B95C63D71438}" type="datetimeFigureOut">
               <a:rPr lang="de-CH" smtClean="0"/>
-              <a:t>19.03.2025</a:t>
+              <a:t>13.05.2025</a:t>
             </a:fld>
             <a:endParaRPr lang="de-CH"/>
           </a:p>
@@ -2101,7 +2100,7 @@
           <a:p>
             <a:fld id="{FCCADD97-FA4F-4F85-9ADA-B95C63D71438}" type="datetimeFigureOut">
               <a:rPr lang="de-CH" smtClean="0"/>
-              <a:t>19.03.2025</a:t>
+              <a:t>13.05.2025</a:t>
             </a:fld>
             <a:endParaRPr lang="de-CH"/>
           </a:p>
@@ -2354,7 +2353,7 @@
           <a:p>
             <a:fld id="{FCCADD97-FA4F-4F85-9ADA-B95C63D71438}" type="datetimeFigureOut">
               <a:rPr lang="de-CH" smtClean="0"/>
-              <a:t>19.03.2025</a:t>
+              <a:t>13.05.2025</a:t>
             </a:fld>
             <a:endParaRPr lang="de-CH"/>
           </a:p>
@@ -2567,7 +2566,7 @@
           <a:p>
             <a:fld id="{FCCADD97-FA4F-4F85-9ADA-B95C63D71438}" type="datetimeFigureOut">
               <a:rPr lang="de-CH" smtClean="0"/>
-              <a:t>19.03.2025</a:t>
+              <a:t>13.05.2025</a:t>
             </a:fld>
             <a:endParaRPr lang="de-CH"/>
           </a:p>
@@ -3059,7 +3058,15 @@
           <a:bodyPr/>
           <a:lstStyle/>
           <a:p>
-            <a:endParaRPr lang="en-US"/>
+            <a:r>
+              <a:rPr lang="en-US" dirty="0" smtClean="0"/>
+              <a:t>Continuous degradation of </a:t>
+            </a:r>
+            <a:r>
+              <a:rPr lang="en-US" dirty="0" smtClean="0"/>
+              <a:t>data</a:t>
+            </a:r>
+            <a:endParaRPr lang="en-US" dirty="0"/>
           </a:p>
         </p:txBody>
       </p:sp>
@@ -3071,1591 +3078,16 @@
           </p:cNvGraphicFramePr>
           <p:nvPr>
             <p:ph idx="1"/>
-          </p:nvPr>
-        </p:nvGraphicFramePr>
-        <p:xfrm>
-          <a:off x="3245802" y="2892266"/>
-          <a:ext cx="5700395" cy="2218055"/>
-        </p:xfrm>
-        <a:graphic>
-          <a:graphicData uri="http://schemas.openxmlformats.org/drawingml/2006/table">
-            <a:tbl>
-              <a:tblPr firstRow="1" firstCol="1" bandRow="1">
-                <a:tableStyleId>{5C22544A-7EE6-4342-B048-85BDC9FD1C3A}</a:tableStyleId>
-              </a:tblPr>
-              <a:tblGrid>
-                <a:gridCol w="1376045">
-                  <a:extLst>
-                    <a:ext uri="{9D8B030D-6E8A-4147-A177-3AD203B41FA5}">
-                      <a16:colId xmlns:a16="http://schemas.microsoft.com/office/drawing/2014/main" val="3481119447"/>
-                    </a:ext>
-                  </a:extLst>
-                </a:gridCol>
-                <a:gridCol w="632460">
-                  <a:extLst>
-                    <a:ext uri="{9D8B030D-6E8A-4147-A177-3AD203B41FA5}">
-                      <a16:colId xmlns:a16="http://schemas.microsoft.com/office/drawing/2014/main" val="2092417540"/>
-                    </a:ext>
-                  </a:extLst>
-                </a:gridCol>
-                <a:gridCol w="894080">
-                  <a:extLst>
-                    <a:ext uri="{9D8B030D-6E8A-4147-A177-3AD203B41FA5}">
-                      <a16:colId xmlns:a16="http://schemas.microsoft.com/office/drawing/2014/main" val="2689633793"/>
-                    </a:ext>
-                  </a:extLst>
-                </a:gridCol>
-                <a:gridCol w="894080">
-                  <a:extLst>
-                    <a:ext uri="{9D8B030D-6E8A-4147-A177-3AD203B41FA5}">
-                      <a16:colId xmlns:a16="http://schemas.microsoft.com/office/drawing/2014/main" val="2611567027"/>
-                    </a:ext>
-                  </a:extLst>
-                </a:gridCol>
-                <a:gridCol w="1000760">
-                  <a:extLst>
-                    <a:ext uri="{9D8B030D-6E8A-4147-A177-3AD203B41FA5}">
-                      <a16:colId xmlns:a16="http://schemas.microsoft.com/office/drawing/2014/main" val="3750521826"/>
-                    </a:ext>
-                  </a:extLst>
-                </a:gridCol>
-                <a:gridCol w="902970">
-                  <a:extLst>
-                    <a:ext uri="{9D8B030D-6E8A-4147-A177-3AD203B41FA5}">
-                      <a16:colId xmlns:a16="http://schemas.microsoft.com/office/drawing/2014/main" val="914609467"/>
-                    </a:ext>
-                  </a:extLst>
-                </a:gridCol>
-              </a:tblGrid>
-              <a:tr h="429895">
-                <a:tc>
-                  <a:txBody>
-                    <a:bodyPr/>
-                    <a:lstStyle/>
-                    <a:p>
-                      <a:pPr marL="0" marR="0" indent="0" algn="ctr">
-                        <a:spcBef>
-                          <a:spcPts val="0"/>
-                        </a:spcBef>
-                        <a:spcAft>
-                          <a:spcPts val="0"/>
-                        </a:spcAft>
-                      </a:pPr>
-                      <a:r>
-                        <a:rPr lang="en-GB" sz="900">
-                          <a:effectLst/>
-                        </a:rPr>
-                        <a:t>Name scenario</a:t>
-                      </a:r>
-                      <a:endParaRPr lang="en-US" sz="1100">
-                        <a:solidFill>
-                          <a:srgbClr val="000000"/>
-                        </a:solidFill>
-                        <a:effectLst/>
-                        <a:latin typeface="Calibri" panose="020F0502020204030204" pitchFamily="34" charset="0"/>
-                        <a:ea typeface="Calibri" panose="020F0502020204030204" pitchFamily="34" charset="0"/>
-                        <a:cs typeface="Times New Roman" panose="02020603050405020304" pitchFamily="18" charset="0"/>
-                      </a:endParaRPr>
-                    </a:p>
-                  </a:txBody>
-                  <a:tcPr marL="68580" marR="68580" marT="0" marB="0" anchor="ctr"/>
-                </a:tc>
-                <a:tc>
-                  <a:txBody>
-                    <a:bodyPr/>
-                    <a:lstStyle/>
-                    <a:p>
-                      <a:pPr marL="0" marR="0" indent="0" algn="ctr">
-                        <a:spcBef>
-                          <a:spcPts val="0"/>
-                        </a:spcBef>
-                        <a:spcAft>
-                          <a:spcPts val="0"/>
-                        </a:spcAft>
-                      </a:pPr>
-                      <a:r>
-                        <a:rPr lang="en-GB" sz="900">
-                          <a:effectLst/>
-                        </a:rPr>
-                        <a:t>Number of sites</a:t>
-                      </a:r>
-                      <a:endParaRPr lang="en-US" sz="1100">
-                        <a:solidFill>
-                          <a:srgbClr val="000000"/>
-                        </a:solidFill>
-                        <a:effectLst/>
-                        <a:latin typeface="Calibri" panose="020F0502020204030204" pitchFamily="34" charset="0"/>
-                        <a:ea typeface="Calibri" panose="020F0502020204030204" pitchFamily="34" charset="0"/>
-                        <a:cs typeface="Times New Roman" panose="02020603050405020304" pitchFamily="18" charset="0"/>
-                      </a:endParaRPr>
-                    </a:p>
-                  </a:txBody>
-                  <a:tcPr marL="68580" marR="68580" marT="0" marB="0" anchor="ctr"/>
-                </a:tc>
-                <a:tc>
-                  <a:txBody>
-                    <a:bodyPr/>
-                    <a:lstStyle/>
-                    <a:p>
-                      <a:pPr marL="0" marR="0" indent="0" algn="ctr">
-                        <a:spcBef>
-                          <a:spcPts val="0"/>
-                        </a:spcBef>
-                        <a:spcAft>
-                          <a:spcPts val="0"/>
-                        </a:spcAft>
-                      </a:pPr>
-                      <a:r>
-                        <a:rPr lang="en-GB" sz="900">
-                          <a:effectLst/>
-                        </a:rPr>
-                        <a:t>Number of environmental predictors</a:t>
-                      </a:r>
-                      <a:endParaRPr lang="en-US" sz="1100">
-                        <a:solidFill>
-                          <a:srgbClr val="000000"/>
-                        </a:solidFill>
-                        <a:effectLst/>
-                        <a:latin typeface="Calibri" panose="020F0502020204030204" pitchFamily="34" charset="0"/>
-                        <a:ea typeface="Calibri" panose="020F0502020204030204" pitchFamily="34" charset="0"/>
-                        <a:cs typeface="Times New Roman" panose="02020603050405020304" pitchFamily="18" charset="0"/>
-                      </a:endParaRPr>
-                    </a:p>
-                  </a:txBody>
-                  <a:tcPr marL="68580" marR="68580" marT="0" marB="0" anchor="ctr"/>
-                </a:tc>
-                <a:tc>
-                  <a:txBody>
-                    <a:bodyPr/>
-                    <a:lstStyle/>
-                    <a:p>
-                      <a:pPr marL="0" marR="0" indent="0" algn="ctr">
-                        <a:spcBef>
-                          <a:spcPts val="0"/>
-                        </a:spcBef>
-                        <a:spcAft>
-                          <a:spcPts val="0"/>
-                        </a:spcAft>
-                      </a:pPr>
-                      <a:r>
-                        <a:rPr lang="en-GB" sz="900">
-                          <a:effectLst/>
-                        </a:rPr>
-                        <a:t>Noise on environmental predictor</a:t>
-                      </a:r>
-                      <a:endParaRPr lang="en-US" sz="1100">
-                        <a:solidFill>
-                          <a:srgbClr val="000000"/>
-                        </a:solidFill>
-                        <a:effectLst/>
-                        <a:latin typeface="Calibri" panose="020F0502020204030204" pitchFamily="34" charset="0"/>
-                        <a:ea typeface="Calibri" panose="020F0502020204030204" pitchFamily="34" charset="0"/>
-                        <a:cs typeface="Times New Roman" panose="02020603050405020304" pitchFamily="18" charset="0"/>
-                      </a:endParaRPr>
-                    </a:p>
-                  </a:txBody>
-                  <a:tcPr marL="68580" marR="68580" marT="0" marB="0" anchor="ctr"/>
-                </a:tc>
-                <a:tc>
-                  <a:txBody>
-                    <a:bodyPr/>
-                    <a:lstStyle/>
-                    <a:p>
-                      <a:pPr marL="0" marR="0" indent="0" algn="ctr">
-                        <a:spcBef>
-                          <a:spcPts val="0"/>
-                        </a:spcBef>
-                        <a:spcAft>
-                          <a:spcPts val="0"/>
-                        </a:spcAft>
-                      </a:pPr>
-                      <a:r>
-                        <a:rPr lang="en-GB" sz="900">
-                          <a:effectLst/>
-                        </a:rPr>
-                        <a:t>Noise on </a:t>
-                      </a:r>
-                      <a:br>
-                        <a:rPr lang="en-GB" sz="900">
-                          <a:effectLst/>
-                        </a:rPr>
-                      </a:br>
-                      <a:r>
-                        <a:rPr lang="en-GB" sz="900">
-                          <a:effectLst/>
-                        </a:rPr>
-                        <a:t>response variable</a:t>
-                      </a:r>
-                      <a:endParaRPr lang="en-US" sz="1100">
-                        <a:solidFill>
-                          <a:srgbClr val="000000"/>
-                        </a:solidFill>
-                        <a:effectLst/>
-                        <a:latin typeface="Calibri" panose="020F0502020204030204" pitchFamily="34" charset="0"/>
-                        <a:ea typeface="Calibri" panose="020F0502020204030204" pitchFamily="34" charset="0"/>
-                        <a:cs typeface="Times New Roman" panose="02020603050405020304" pitchFamily="18" charset="0"/>
-                      </a:endParaRPr>
-                    </a:p>
-                  </a:txBody>
-                  <a:tcPr marL="68580" marR="68580" marT="0" marB="0" anchor="ctr"/>
-                </a:tc>
-                <a:tc>
-                  <a:txBody>
-                    <a:bodyPr/>
-                    <a:lstStyle/>
-                    <a:p>
-                      <a:pPr marL="0" marR="0" indent="0" algn="ctr">
-                        <a:spcBef>
-                          <a:spcPts val="0"/>
-                        </a:spcBef>
-                        <a:spcAft>
-                          <a:spcPts val="0"/>
-                        </a:spcAft>
-                      </a:pPr>
-                      <a:r>
-                        <a:rPr lang="en-GB" sz="900">
-                          <a:effectLst/>
-                        </a:rPr>
-                        <a:t>Absences due to dispersal limitation</a:t>
-                      </a:r>
-                      <a:endParaRPr lang="en-US" sz="1100">
-                        <a:solidFill>
-                          <a:srgbClr val="000000"/>
-                        </a:solidFill>
-                        <a:effectLst/>
-                        <a:latin typeface="Calibri" panose="020F0502020204030204" pitchFamily="34" charset="0"/>
-                        <a:ea typeface="Calibri" panose="020F0502020204030204" pitchFamily="34" charset="0"/>
-                        <a:cs typeface="Times New Roman" panose="02020603050405020304" pitchFamily="18" charset="0"/>
-                      </a:endParaRPr>
-                    </a:p>
-                  </a:txBody>
-                  <a:tcPr marL="68580" marR="68580" marT="0" marB="0" anchor="ctr"/>
-                </a:tc>
-                <a:extLst>
-                  <a:ext uri="{0D108BD9-81ED-4DB2-BD59-A6C34878D82A}">
-                    <a16:rowId xmlns:a16="http://schemas.microsoft.com/office/drawing/2014/main" val="3271815072"/>
-                  </a:ext>
-                </a:extLst>
-              </a:tr>
-              <a:tr h="185420">
-                <a:tc>
-                  <a:txBody>
-                    <a:bodyPr/>
-                    <a:lstStyle/>
-                    <a:p>
-                      <a:pPr marL="0" marR="0" indent="0" algn="ctr">
-                        <a:spcBef>
-                          <a:spcPts val="0"/>
-                        </a:spcBef>
-                        <a:spcAft>
-                          <a:spcPts val="0"/>
-                        </a:spcAft>
-                      </a:pPr>
-                      <a:r>
-                        <a:rPr lang="en-GB" sz="900">
-                          <a:effectLst/>
-                        </a:rPr>
-                        <a:t>S1: Best-case scenario</a:t>
-                      </a:r>
-                      <a:endParaRPr lang="en-US" sz="1100">
-                        <a:solidFill>
-                          <a:srgbClr val="000000"/>
-                        </a:solidFill>
-                        <a:effectLst/>
-                        <a:latin typeface="Calibri" panose="020F0502020204030204" pitchFamily="34" charset="0"/>
-                        <a:ea typeface="Calibri" panose="020F0502020204030204" pitchFamily="34" charset="0"/>
-                        <a:cs typeface="Times New Roman" panose="02020603050405020304" pitchFamily="18" charset="0"/>
-                      </a:endParaRPr>
-                    </a:p>
-                  </a:txBody>
-                  <a:tcPr marL="68580" marR="68580" marT="0" marB="0" anchor="ctr"/>
-                </a:tc>
-                <a:tc>
-                  <a:txBody>
-                    <a:bodyPr/>
-                    <a:lstStyle/>
-                    <a:p>
-                      <a:pPr marL="0" marR="0" indent="0" algn="ctr">
-                        <a:spcBef>
-                          <a:spcPts val="0"/>
-                        </a:spcBef>
-                        <a:spcAft>
-                          <a:spcPts val="0"/>
-                        </a:spcAft>
-                      </a:pPr>
-                      <a:r>
-                        <a:rPr lang="en-GB" sz="900">
-                          <a:effectLst/>
-                        </a:rPr>
-                        <a:t>3000</a:t>
-                      </a:r>
-                      <a:endParaRPr lang="en-US" sz="1100">
-                        <a:solidFill>
-                          <a:srgbClr val="000000"/>
-                        </a:solidFill>
-                        <a:effectLst/>
-                        <a:latin typeface="Calibri" panose="020F0502020204030204" pitchFamily="34" charset="0"/>
-                        <a:ea typeface="Calibri" panose="020F0502020204030204" pitchFamily="34" charset="0"/>
-                        <a:cs typeface="Times New Roman" panose="02020603050405020304" pitchFamily="18" charset="0"/>
-                      </a:endParaRPr>
-                    </a:p>
-                  </a:txBody>
-                  <a:tcPr marL="68580" marR="68580" marT="0" marB="0" anchor="ctr"/>
-                </a:tc>
-                <a:tc>
-                  <a:txBody>
-                    <a:bodyPr/>
-                    <a:lstStyle/>
-                    <a:p>
-                      <a:pPr marL="0" marR="0" indent="0" algn="ctr">
-                        <a:spcBef>
-                          <a:spcPts val="0"/>
-                        </a:spcBef>
-                        <a:spcAft>
-                          <a:spcPts val="0"/>
-                        </a:spcAft>
-                      </a:pPr>
-                      <a:r>
-                        <a:rPr lang="en-GB" sz="900">
-                          <a:effectLst/>
-                        </a:rPr>
-                        <a:t>8</a:t>
-                      </a:r>
-                      <a:endParaRPr lang="en-US" sz="1100">
-                        <a:solidFill>
-                          <a:srgbClr val="000000"/>
-                        </a:solidFill>
-                        <a:effectLst/>
-                        <a:latin typeface="Calibri" panose="020F0502020204030204" pitchFamily="34" charset="0"/>
-                        <a:ea typeface="Calibri" panose="020F0502020204030204" pitchFamily="34" charset="0"/>
-                        <a:cs typeface="Times New Roman" panose="02020603050405020304" pitchFamily="18" charset="0"/>
-                      </a:endParaRPr>
-                    </a:p>
-                  </a:txBody>
-                  <a:tcPr marL="68580" marR="68580" marT="0" marB="0" anchor="ctr"/>
-                </a:tc>
-                <a:tc>
-                  <a:txBody>
-                    <a:bodyPr/>
-                    <a:lstStyle/>
-                    <a:p>
-                      <a:pPr marL="0" marR="0" indent="0" algn="ctr">
-                        <a:spcBef>
-                          <a:spcPts val="0"/>
-                        </a:spcBef>
-                        <a:spcAft>
-                          <a:spcPts val="0"/>
-                        </a:spcAft>
-                      </a:pPr>
-                      <a:r>
-                        <a:rPr lang="en-GB" sz="900">
-                          <a:effectLst/>
-                        </a:rPr>
-                        <a:t>no</a:t>
-                      </a:r>
-                      <a:endParaRPr lang="en-US" sz="1100">
-                        <a:solidFill>
-                          <a:srgbClr val="000000"/>
-                        </a:solidFill>
-                        <a:effectLst/>
-                        <a:latin typeface="Calibri" panose="020F0502020204030204" pitchFamily="34" charset="0"/>
-                        <a:ea typeface="Calibri" panose="020F0502020204030204" pitchFamily="34" charset="0"/>
-                        <a:cs typeface="Times New Roman" panose="02020603050405020304" pitchFamily="18" charset="0"/>
-                      </a:endParaRPr>
-                    </a:p>
-                  </a:txBody>
-                  <a:tcPr marL="68580" marR="68580" marT="0" marB="0" anchor="ctr"/>
-                </a:tc>
-                <a:tc>
-                  <a:txBody>
-                    <a:bodyPr/>
-                    <a:lstStyle/>
-                    <a:p>
-                      <a:pPr marL="0" marR="0" indent="0" algn="ctr">
-                        <a:spcBef>
-                          <a:spcPts val="0"/>
-                        </a:spcBef>
-                        <a:spcAft>
-                          <a:spcPts val="0"/>
-                        </a:spcAft>
-                      </a:pPr>
-                      <a:r>
-                        <a:rPr lang="en-GB" sz="900">
-                          <a:effectLst/>
-                        </a:rPr>
-                        <a:t>no</a:t>
-                      </a:r>
-                      <a:endParaRPr lang="en-US" sz="1100">
-                        <a:solidFill>
-                          <a:srgbClr val="000000"/>
-                        </a:solidFill>
-                        <a:effectLst/>
-                        <a:latin typeface="Calibri" panose="020F0502020204030204" pitchFamily="34" charset="0"/>
-                        <a:ea typeface="Calibri" panose="020F0502020204030204" pitchFamily="34" charset="0"/>
-                        <a:cs typeface="Times New Roman" panose="02020603050405020304" pitchFamily="18" charset="0"/>
-                      </a:endParaRPr>
-                    </a:p>
-                  </a:txBody>
-                  <a:tcPr marL="68580" marR="68580" marT="0" marB="0" anchor="ctr"/>
-                </a:tc>
-                <a:tc>
-                  <a:txBody>
-                    <a:bodyPr/>
-                    <a:lstStyle/>
-                    <a:p>
-                      <a:pPr marL="0" marR="0" indent="0" algn="ctr">
-                        <a:spcBef>
-                          <a:spcPts val="0"/>
-                        </a:spcBef>
-                        <a:spcAft>
-                          <a:spcPts val="0"/>
-                        </a:spcAft>
-                      </a:pPr>
-                      <a:r>
-                        <a:rPr lang="en-GB" sz="900">
-                          <a:effectLst/>
-                        </a:rPr>
-                        <a:t>no</a:t>
-                      </a:r>
-                      <a:endParaRPr lang="en-US" sz="1100">
-                        <a:solidFill>
-                          <a:srgbClr val="000000"/>
-                        </a:solidFill>
-                        <a:effectLst/>
-                        <a:latin typeface="Calibri" panose="020F0502020204030204" pitchFamily="34" charset="0"/>
-                        <a:ea typeface="Calibri" panose="020F0502020204030204" pitchFamily="34" charset="0"/>
-                        <a:cs typeface="Times New Roman" panose="02020603050405020304" pitchFamily="18" charset="0"/>
-                      </a:endParaRPr>
-                    </a:p>
-                  </a:txBody>
-                  <a:tcPr marL="68580" marR="68580" marT="0" marB="0" anchor="ctr"/>
-                </a:tc>
-                <a:extLst>
-                  <a:ext uri="{0D108BD9-81ED-4DB2-BD59-A6C34878D82A}">
-                    <a16:rowId xmlns:a16="http://schemas.microsoft.com/office/drawing/2014/main" val="989798923"/>
-                  </a:ext>
-                </a:extLst>
-              </a:tr>
-              <a:tr h="185420">
-                <a:tc>
-                  <a:txBody>
-                    <a:bodyPr/>
-                    <a:lstStyle/>
-                    <a:p>
-                      <a:pPr marL="0" marR="0" indent="0" algn="ctr">
-                        <a:spcBef>
-                          <a:spcPts val="0"/>
-                        </a:spcBef>
-                        <a:spcAft>
-                          <a:spcPts val="0"/>
-                        </a:spcAft>
-                      </a:pPr>
-                      <a:r>
-                        <a:rPr lang="en-GB" sz="900">
-                          <a:effectLst/>
-                        </a:rPr>
-                        <a:t>S2: Reduced dataset size</a:t>
-                      </a:r>
-                      <a:endParaRPr lang="en-US" sz="1100">
-                        <a:solidFill>
-                          <a:srgbClr val="000000"/>
-                        </a:solidFill>
-                        <a:effectLst/>
-                        <a:latin typeface="Calibri" panose="020F0502020204030204" pitchFamily="34" charset="0"/>
-                        <a:ea typeface="Calibri" panose="020F0502020204030204" pitchFamily="34" charset="0"/>
-                        <a:cs typeface="Times New Roman" panose="02020603050405020304" pitchFamily="18" charset="0"/>
-                      </a:endParaRPr>
-                    </a:p>
-                  </a:txBody>
-                  <a:tcPr marL="68580" marR="68580" marT="0" marB="0" anchor="ctr"/>
-                </a:tc>
-                <a:tc>
-                  <a:txBody>
-                    <a:bodyPr/>
-                    <a:lstStyle/>
-                    <a:p>
-                      <a:pPr marL="0" marR="0" indent="0" algn="ctr">
-                        <a:spcBef>
-                          <a:spcPts val="0"/>
-                        </a:spcBef>
-                        <a:spcAft>
-                          <a:spcPts val="0"/>
-                        </a:spcAft>
-                      </a:pPr>
-                      <a:r>
-                        <a:rPr lang="en-GB" sz="900">
-                          <a:effectLst/>
-                        </a:rPr>
-                        <a:t>300</a:t>
-                      </a:r>
-                      <a:endParaRPr lang="en-US" sz="1100">
-                        <a:solidFill>
-                          <a:srgbClr val="000000"/>
-                        </a:solidFill>
-                        <a:effectLst/>
-                        <a:latin typeface="Calibri" panose="020F0502020204030204" pitchFamily="34" charset="0"/>
-                        <a:ea typeface="Calibri" panose="020F0502020204030204" pitchFamily="34" charset="0"/>
-                        <a:cs typeface="Times New Roman" panose="02020603050405020304" pitchFamily="18" charset="0"/>
-                      </a:endParaRPr>
-                    </a:p>
-                  </a:txBody>
-                  <a:tcPr marL="68580" marR="68580" marT="0" marB="0" anchor="ctr"/>
-                </a:tc>
-                <a:tc>
-                  <a:txBody>
-                    <a:bodyPr/>
-                    <a:lstStyle/>
-                    <a:p>
-                      <a:pPr marL="0" marR="0" indent="0" algn="ctr">
-                        <a:spcBef>
-                          <a:spcPts val="0"/>
-                        </a:spcBef>
-                        <a:spcAft>
-                          <a:spcPts val="0"/>
-                        </a:spcAft>
-                      </a:pPr>
-                      <a:r>
-                        <a:rPr lang="en-GB" sz="900">
-                          <a:effectLst/>
-                        </a:rPr>
-                        <a:t>8</a:t>
-                      </a:r>
-                      <a:endParaRPr lang="en-US" sz="1100">
-                        <a:solidFill>
-                          <a:srgbClr val="000000"/>
-                        </a:solidFill>
-                        <a:effectLst/>
-                        <a:latin typeface="Calibri" panose="020F0502020204030204" pitchFamily="34" charset="0"/>
-                        <a:ea typeface="Calibri" panose="020F0502020204030204" pitchFamily="34" charset="0"/>
-                        <a:cs typeface="Times New Roman" panose="02020603050405020304" pitchFamily="18" charset="0"/>
-                      </a:endParaRPr>
-                    </a:p>
-                  </a:txBody>
-                  <a:tcPr marL="68580" marR="68580" marT="0" marB="0" anchor="ctr"/>
-                </a:tc>
-                <a:tc>
-                  <a:txBody>
-                    <a:bodyPr/>
-                    <a:lstStyle/>
-                    <a:p>
-                      <a:pPr marL="0" marR="0" indent="0" algn="ctr">
-                        <a:spcBef>
-                          <a:spcPts val="0"/>
-                        </a:spcBef>
-                        <a:spcAft>
-                          <a:spcPts val="0"/>
-                        </a:spcAft>
-                      </a:pPr>
-                      <a:r>
-                        <a:rPr lang="en-GB" sz="900">
-                          <a:effectLst/>
-                        </a:rPr>
-                        <a:t>no</a:t>
-                      </a:r>
-                      <a:endParaRPr lang="en-US" sz="1100">
-                        <a:solidFill>
-                          <a:srgbClr val="000000"/>
-                        </a:solidFill>
-                        <a:effectLst/>
-                        <a:latin typeface="Calibri" panose="020F0502020204030204" pitchFamily="34" charset="0"/>
-                        <a:ea typeface="Calibri" panose="020F0502020204030204" pitchFamily="34" charset="0"/>
-                        <a:cs typeface="Times New Roman" panose="02020603050405020304" pitchFamily="18" charset="0"/>
-                      </a:endParaRPr>
-                    </a:p>
-                  </a:txBody>
-                  <a:tcPr marL="68580" marR="68580" marT="0" marB="0" anchor="ctr"/>
-                </a:tc>
-                <a:tc>
-                  <a:txBody>
-                    <a:bodyPr/>
-                    <a:lstStyle/>
-                    <a:p>
-                      <a:pPr marL="0" marR="0" indent="0" algn="ctr">
-                        <a:spcBef>
-                          <a:spcPts val="0"/>
-                        </a:spcBef>
-                        <a:spcAft>
-                          <a:spcPts val="0"/>
-                        </a:spcAft>
-                      </a:pPr>
-                      <a:r>
-                        <a:rPr lang="en-GB" sz="900">
-                          <a:effectLst/>
-                        </a:rPr>
-                        <a:t>no</a:t>
-                      </a:r>
-                      <a:endParaRPr lang="en-US" sz="1100">
-                        <a:solidFill>
-                          <a:srgbClr val="000000"/>
-                        </a:solidFill>
-                        <a:effectLst/>
-                        <a:latin typeface="Calibri" panose="020F0502020204030204" pitchFamily="34" charset="0"/>
-                        <a:ea typeface="Calibri" panose="020F0502020204030204" pitchFamily="34" charset="0"/>
-                        <a:cs typeface="Times New Roman" panose="02020603050405020304" pitchFamily="18" charset="0"/>
-                      </a:endParaRPr>
-                    </a:p>
-                  </a:txBody>
-                  <a:tcPr marL="68580" marR="68580" marT="0" marB="0" anchor="ctr"/>
-                </a:tc>
-                <a:tc>
-                  <a:txBody>
-                    <a:bodyPr/>
-                    <a:lstStyle/>
-                    <a:p>
-                      <a:pPr marL="0" marR="0" indent="0" algn="ctr">
-                        <a:spcBef>
-                          <a:spcPts val="0"/>
-                        </a:spcBef>
-                        <a:spcAft>
-                          <a:spcPts val="0"/>
-                        </a:spcAft>
-                      </a:pPr>
-                      <a:r>
-                        <a:rPr lang="en-GB" sz="900">
-                          <a:effectLst/>
-                        </a:rPr>
-                        <a:t>no</a:t>
-                      </a:r>
-                      <a:endParaRPr lang="en-US" sz="1100">
-                        <a:solidFill>
-                          <a:srgbClr val="000000"/>
-                        </a:solidFill>
-                        <a:effectLst/>
-                        <a:latin typeface="Calibri" panose="020F0502020204030204" pitchFamily="34" charset="0"/>
-                        <a:ea typeface="Calibri" panose="020F0502020204030204" pitchFamily="34" charset="0"/>
-                        <a:cs typeface="Times New Roman" panose="02020603050405020304" pitchFamily="18" charset="0"/>
-                      </a:endParaRPr>
-                    </a:p>
-                  </a:txBody>
-                  <a:tcPr marL="68580" marR="68580" marT="0" marB="0" anchor="ctr"/>
-                </a:tc>
-                <a:extLst>
-                  <a:ext uri="{0D108BD9-81ED-4DB2-BD59-A6C34878D82A}">
-                    <a16:rowId xmlns:a16="http://schemas.microsoft.com/office/drawing/2014/main" val="4256688548"/>
-                  </a:ext>
-                </a:extLst>
-              </a:tr>
-              <a:tr h="274320">
-                <a:tc>
-                  <a:txBody>
-                    <a:bodyPr/>
-                    <a:lstStyle/>
-                    <a:p>
-                      <a:pPr marL="0" marR="0" indent="0" algn="ctr">
-                        <a:spcBef>
-                          <a:spcPts val="0"/>
-                        </a:spcBef>
-                        <a:spcAft>
-                          <a:spcPts val="0"/>
-                        </a:spcAft>
-                      </a:pPr>
-                      <a:r>
-                        <a:rPr lang="en-GB" sz="900">
-                          <a:effectLst/>
-                        </a:rPr>
-                        <a:t>S3: Removed environmental predictors</a:t>
-                      </a:r>
-                      <a:endParaRPr lang="en-US" sz="1100">
-                        <a:solidFill>
-                          <a:srgbClr val="000000"/>
-                        </a:solidFill>
-                        <a:effectLst/>
-                        <a:latin typeface="Calibri" panose="020F0502020204030204" pitchFamily="34" charset="0"/>
-                        <a:ea typeface="Calibri" panose="020F0502020204030204" pitchFamily="34" charset="0"/>
-                        <a:cs typeface="Times New Roman" panose="02020603050405020304" pitchFamily="18" charset="0"/>
-                      </a:endParaRPr>
-                    </a:p>
-                  </a:txBody>
-                  <a:tcPr marL="68580" marR="68580" marT="0" marB="0" anchor="ctr"/>
-                </a:tc>
-                <a:tc>
-                  <a:txBody>
-                    <a:bodyPr/>
-                    <a:lstStyle/>
-                    <a:p>
-                      <a:pPr marL="0" marR="0" indent="0" algn="ctr">
-                        <a:spcBef>
-                          <a:spcPts val="0"/>
-                        </a:spcBef>
-                        <a:spcAft>
-                          <a:spcPts val="0"/>
-                        </a:spcAft>
-                      </a:pPr>
-                      <a:r>
-                        <a:rPr lang="en-GB" sz="900">
-                          <a:effectLst/>
-                        </a:rPr>
-                        <a:t>3000</a:t>
-                      </a:r>
-                      <a:endParaRPr lang="en-US" sz="1100">
-                        <a:solidFill>
-                          <a:srgbClr val="000000"/>
-                        </a:solidFill>
-                        <a:effectLst/>
-                        <a:latin typeface="Calibri" panose="020F0502020204030204" pitchFamily="34" charset="0"/>
-                        <a:ea typeface="Calibri" panose="020F0502020204030204" pitchFamily="34" charset="0"/>
-                        <a:cs typeface="Times New Roman" panose="02020603050405020304" pitchFamily="18" charset="0"/>
-                      </a:endParaRPr>
-                    </a:p>
-                  </a:txBody>
-                  <a:tcPr marL="68580" marR="68580" marT="0" marB="0" anchor="ctr"/>
-                </a:tc>
-                <a:tc>
-                  <a:txBody>
-                    <a:bodyPr/>
-                    <a:lstStyle/>
-                    <a:p>
-                      <a:pPr marL="0" marR="0" indent="0" algn="ctr">
-                        <a:spcBef>
-                          <a:spcPts val="0"/>
-                        </a:spcBef>
-                        <a:spcAft>
-                          <a:spcPts val="0"/>
-                        </a:spcAft>
-                      </a:pPr>
-                      <a:r>
-                        <a:rPr lang="en-GB" sz="900">
-                          <a:effectLst/>
-                        </a:rPr>
-                        <a:t>4</a:t>
-                      </a:r>
-                      <a:endParaRPr lang="en-US" sz="1100">
-                        <a:solidFill>
-                          <a:srgbClr val="000000"/>
-                        </a:solidFill>
-                        <a:effectLst/>
-                        <a:latin typeface="Calibri" panose="020F0502020204030204" pitchFamily="34" charset="0"/>
-                        <a:ea typeface="Calibri" panose="020F0502020204030204" pitchFamily="34" charset="0"/>
-                        <a:cs typeface="Times New Roman" panose="02020603050405020304" pitchFamily="18" charset="0"/>
-                      </a:endParaRPr>
-                    </a:p>
-                  </a:txBody>
-                  <a:tcPr marL="68580" marR="68580" marT="0" marB="0" anchor="ctr"/>
-                </a:tc>
-                <a:tc>
-                  <a:txBody>
-                    <a:bodyPr/>
-                    <a:lstStyle/>
-                    <a:p>
-                      <a:pPr marL="0" marR="0" indent="0" algn="ctr">
-                        <a:spcBef>
-                          <a:spcPts val="0"/>
-                        </a:spcBef>
-                        <a:spcAft>
-                          <a:spcPts val="0"/>
-                        </a:spcAft>
-                      </a:pPr>
-                      <a:r>
-                        <a:rPr lang="en-GB" sz="900">
-                          <a:effectLst/>
-                        </a:rPr>
-                        <a:t>no</a:t>
-                      </a:r>
-                      <a:endParaRPr lang="en-US" sz="1100">
-                        <a:solidFill>
-                          <a:srgbClr val="000000"/>
-                        </a:solidFill>
-                        <a:effectLst/>
-                        <a:latin typeface="Calibri" panose="020F0502020204030204" pitchFamily="34" charset="0"/>
-                        <a:ea typeface="Calibri" panose="020F0502020204030204" pitchFamily="34" charset="0"/>
-                        <a:cs typeface="Times New Roman" panose="02020603050405020304" pitchFamily="18" charset="0"/>
-                      </a:endParaRPr>
-                    </a:p>
-                  </a:txBody>
-                  <a:tcPr marL="68580" marR="68580" marT="0" marB="0" anchor="ctr"/>
-                </a:tc>
-                <a:tc>
-                  <a:txBody>
-                    <a:bodyPr/>
-                    <a:lstStyle/>
-                    <a:p>
-                      <a:pPr marL="0" marR="0" indent="0" algn="ctr">
-                        <a:spcBef>
-                          <a:spcPts val="0"/>
-                        </a:spcBef>
-                        <a:spcAft>
-                          <a:spcPts val="0"/>
-                        </a:spcAft>
-                      </a:pPr>
-                      <a:r>
-                        <a:rPr lang="en-GB" sz="900">
-                          <a:effectLst/>
-                        </a:rPr>
-                        <a:t>no</a:t>
-                      </a:r>
-                      <a:endParaRPr lang="en-US" sz="1100">
-                        <a:solidFill>
-                          <a:srgbClr val="000000"/>
-                        </a:solidFill>
-                        <a:effectLst/>
-                        <a:latin typeface="Calibri" panose="020F0502020204030204" pitchFamily="34" charset="0"/>
-                        <a:ea typeface="Calibri" panose="020F0502020204030204" pitchFamily="34" charset="0"/>
-                        <a:cs typeface="Times New Roman" panose="02020603050405020304" pitchFamily="18" charset="0"/>
-                      </a:endParaRPr>
-                    </a:p>
-                  </a:txBody>
-                  <a:tcPr marL="68580" marR="68580" marT="0" marB="0" anchor="ctr"/>
-                </a:tc>
-                <a:tc>
-                  <a:txBody>
-                    <a:bodyPr/>
-                    <a:lstStyle/>
-                    <a:p>
-                      <a:pPr marL="0" marR="0" indent="0" algn="ctr">
-                        <a:spcBef>
-                          <a:spcPts val="0"/>
-                        </a:spcBef>
-                        <a:spcAft>
-                          <a:spcPts val="0"/>
-                        </a:spcAft>
-                      </a:pPr>
-                      <a:r>
-                        <a:rPr lang="en-GB" sz="900">
-                          <a:effectLst/>
-                        </a:rPr>
-                        <a:t>no</a:t>
-                      </a:r>
-                      <a:endParaRPr lang="en-US" sz="1100">
-                        <a:solidFill>
-                          <a:srgbClr val="000000"/>
-                        </a:solidFill>
-                        <a:effectLst/>
-                        <a:latin typeface="Calibri" panose="020F0502020204030204" pitchFamily="34" charset="0"/>
-                        <a:ea typeface="Calibri" panose="020F0502020204030204" pitchFamily="34" charset="0"/>
-                        <a:cs typeface="Times New Roman" panose="02020603050405020304" pitchFamily="18" charset="0"/>
-                      </a:endParaRPr>
-                    </a:p>
-                  </a:txBody>
-                  <a:tcPr marL="68580" marR="68580" marT="0" marB="0" anchor="ctr"/>
-                </a:tc>
-                <a:extLst>
-                  <a:ext uri="{0D108BD9-81ED-4DB2-BD59-A6C34878D82A}">
-                    <a16:rowId xmlns:a16="http://schemas.microsoft.com/office/drawing/2014/main" val="1876879927"/>
-                  </a:ext>
-                </a:extLst>
-              </a:tr>
-              <a:tr h="457200">
-                <a:tc>
-                  <a:txBody>
-                    <a:bodyPr/>
-                    <a:lstStyle/>
-                    <a:p>
-                      <a:pPr marL="0" marR="0" indent="0" algn="ctr">
-                        <a:spcBef>
-                          <a:spcPts val="0"/>
-                        </a:spcBef>
-                        <a:spcAft>
-                          <a:spcPts val="0"/>
-                        </a:spcAft>
-                      </a:pPr>
-                      <a:r>
-                        <a:rPr lang="en-GB" sz="900">
-                          <a:effectLst/>
-                        </a:rPr>
-                        <a:t>S4: Noise on temperature</a:t>
-                      </a:r>
-                      <a:endParaRPr lang="en-US" sz="1100">
-                        <a:solidFill>
-                          <a:srgbClr val="000000"/>
-                        </a:solidFill>
-                        <a:effectLst/>
-                        <a:latin typeface="Calibri" panose="020F0502020204030204" pitchFamily="34" charset="0"/>
-                        <a:ea typeface="Calibri" panose="020F0502020204030204" pitchFamily="34" charset="0"/>
-                        <a:cs typeface="Times New Roman" panose="02020603050405020304" pitchFamily="18" charset="0"/>
-                      </a:endParaRPr>
-                    </a:p>
-                  </a:txBody>
-                  <a:tcPr marL="68580" marR="68580" marT="0" marB="0" anchor="ctr"/>
-                </a:tc>
-                <a:tc>
-                  <a:txBody>
-                    <a:bodyPr/>
-                    <a:lstStyle/>
-                    <a:p>
-                      <a:pPr marL="0" marR="0" indent="0" algn="ctr">
-                        <a:spcBef>
-                          <a:spcPts val="0"/>
-                        </a:spcBef>
-                        <a:spcAft>
-                          <a:spcPts val="0"/>
-                        </a:spcAft>
-                      </a:pPr>
-                      <a:r>
-                        <a:rPr lang="en-GB" sz="900">
-                          <a:effectLst/>
-                        </a:rPr>
-                        <a:t>3000</a:t>
-                      </a:r>
-                      <a:endParaRPr lang="en-US" sz="1100">
-                        <a:solidFill>
-                          <a:srgbClr val="000000"/>
-                        </a:solidFill>
-                        <a:effectLst/>
-                        <a:latin typeface="Calibri" panose="020F0502020204030204" pitchFamily="34" charset="0"/>
-                        <a:ea typeface="Calibri" panose="020F0502020204030204" pitchFamily="34" charset="0"/>
-                        <a:cs typeface="Times New Roman" panose="02020603050405020304" pitchFamily="18" charset="0"/>
-                      </a:endParaRPr>
-                    </a:p>
-                  </a:txBody>
-                  <a:tcPr marL="68580" marR="68580" marT="0" marB="0" anchor="ctr"/>
-                </a:tc>
-                <a:tc>
-                  <a:txBody>
-                    <a:bodyPr/>
-                    <a:lstStyle/>
-                    <a:p>
-                      <a:pPr marL="0" marR="0" indent="0" algn="ctr">
-                        <a:spcBef>
-                          <a:spcPts val="0"/>
-                        </a:spcBef>
-                        <a:spcAft>
-                          <a:spcPts val="0"/>
-                        </a:spcAft>
-                      </a:pPr>
-                      <a:r>
-                        <a:rPr lang="en-GB" sz="900">
-                          <a:effectLst/>
-                        </a:rPr>
-                        <a:t>8</a:t>
-                      </a:r>
-                      <a:endParaRPr lang="en-US" sz="1100">
-                        <a:solidFill>
-                          <a:srgbClr val="000000"/>
-                        </a:solidFill>
-                        <a:effectLst/>
-                        <a:latin typeface="Calibri" panose="020F0502020204030204" pitchFamily="34" charset="0"/>
-                        <a:ea typeface="Calibri" panose="020F0502020204030204" pitchFamily="34" charset="0"/>
-                        <a:cs typeface="Times New Roman" panose="02020603050405020304" pitchFamily="18" charset="0"/>
-                      </a:endParaRPr>
-                    </a:p>
-                  </a:txBody>
-                  <a:tcPr marL="68580" marR="68580" marT="0" marB="0" anchor="ctr"/>
-                </a:tc>
-                <a:tc>
-                  <a:txBody>
-                    <a:bodyPr/>
-                    <a:lstStyle/>
-                    <a:p>
-                      <a:pPr marL="0" marR="0" indent="0" algn="ctr">
-                        <a:spcBef>
-                          <a:spcPts val="0"/>
-                        </a:spcBef>
-                        <a:spcAft>
-                          <a:spcPts val="0"/>
-                        </a:spcAft>
-                      </a:pPr>
-                      <a:r>
-                        <a:rPr lang="en-GB" sz="900" dirty="0">
-                          <a:effectLst/>
-                        </a:rPr>
-                        <a:t>Gaussian noise </a:t>
-                      </a:r>
-                      <a:br>
-                        <a:rPr lang="en-GB" sz="900" dirty="0">
-                          <a:effectLst/>
-                        </a:rPr>
-                      </a:br>
-                      <a:r>
-                        <a:rPr lang="en-GB" sz="900" dirty="0">
-                          <a:effectLst/>
-                        </a:rPr>
-                        <a:t>on temperature</a:t>
-                      </a:r>
-                      <a:endParaRPr lang="en-US" sz="1100" dirty="0">
-                        <a:effectLst/>
-                      </a:endParaRPr>
-                    </a:p>
-                    <a:p>
-                      <a:pPr marL="0" marR="0" indent="0" algn="ctr">
-                        <a:spcBef>
-                          <a:spcPts val="0"/>
-                        </a:spcBef>
-                        <a:spcAft>
-                          <a:spcPts val="0"/>
-                        </a:spcAft>
-                      </a:pPr>
-                      <a:r>
-                        <a:rPr lang="en-GB" sz="900" dirty="0">
-                          <a:effectLst/>
-                          <a:sym typeface="Symbol" panose="05050102010706020507" pitchFamily="18" charset="2"/>
-                        </a:rPr>
-                        <a:t></a:t>
-                      </a:r>
-                      <a:r>
-                        <a:rPr lang="en-GB" sz="900" dirty="0">
-                          <a:effectLst/>
-                        </a:rPr>
-                        <a:t> = 0, </a:t>
-                      </a:r>
-                      <a:r>
-                        <a:rPr lang="en-GB" sz="900" dirty="0">
-                          <a:effectLst/>
-                          <a:sym typeface="Symbol" panose="05050102010706020507" pitchFamily="18" charset="2"/>
-                        </a:rPr>
-                        <a:t></a:t>
-                      </a:r>
-                      <a:r>
-                        <a:rPr lang="en-GB" sz="900" dirty="0">
-                          <a:effectLst/>
-                        </a:rPr>
-                        <a:t> = 3</a:t>
-                      </a:r>
-                      <a:endParaRPr lang="en-US" sz="1100" dirty="0">
-                        <a:solidFill>
-                          <a:srgbClr val="000000"/>
-                        </a:solidFill>
-                        <a:effectLst/>
-                        <a:latin typeface="Calibri" panose="020F0502020204030204" pitchFamily="34" charset="0"/>
-                        <a:ea typeface="Calibri" panose="020F0502020204030204" pitchFamily="34" charset="0"/>
-                        <a:cs typeface="Times New Roman" panose="02020603050405020304" pitchFamily="18" charset="0"/>
-                      </a:endParaRPr>
-                    </a:p>
-                  </a:txBody>
-                  <a:tcPr marL="68580" marR="68580" marT="0" marB="0" anchor="ctr"/>
-                </a:tc>
-                <a:tc>
-                  <a:txBody>
-                    <a:bodyPr/>
-                    <a:lstStyle/>
-                    <a:p>
-                      <a:pPr marL="0" marR="0" indent="0" algn="ctr">
-                        <a:spcBef>
-                          <a:spcPts val="0"/>
-                        </a:spcBef>
-                        <a:spcAft>
-                          <a:spcPts val="0"/>
-                        </a:spcAft>
-                      </a:pPr>
-                      <a:r>
-                        <a:rPr lang="en-GB" sz="900">
-                          <a:effectLst/>
-                        </a:rPr>
-                        <a:t>no</a:t>
-                      </a:r>
-                      <a:endParaRPr lang="en-US" sz="1100">
-                        <a:solidFill>
-                          <a:srgbClr val="000000"/>
-                        </a:solidFill>
-                        <a:effectLst/>
-                        <a:latin typeface="Calibri" panose="020F0502020204030204" pitchFamily="34" charset="0"/>
-                        <a:ea typeface="Calibri" panose="020F0502020204030204" pitchFamily="34" charset="0"/>
-                        <a:cs typeface="Times New Roman" panose="02020603050405020304" pitchFamily="18" charset="0"/>
-                      </a:endParaRPr>
-                    </a:p>
-                  </a:txBody>
-                  <a:tcPr marL="68580" marR="68580" marT="0" marB="0" anchor="ctr"/>
-                </a:tc>
-                <a:tc>
-                  <a:txBody>
-                    <a:bodyPr/>
-                    <a:lstStyle/>
-                    <a:p>
-                      <a:pPr marL="0" marR="0" indent="0" algn="ctr">
-                        <a:spcBef>
-                          <a:spcPts val="0"/>
-                        </a:spcBef>
-                        <a:spcAft>
-                          <a:spcPts val="0"/>
-                        </a:spcAft>
-                      </a:pPr>
-                      <a:r>
-                        <a:rPr lang="en-GB" sz="900">
-                          <a:effectLst/>
-                        </a:rPr>
-                        <a:t>no</a:t>
-                      </a:r>
-                      <a:endParaRPr lang="en-US" sz="1100">
-                        <a:solidFill>
-                          <a:srgbClr val="000000"/>
-                        </a:solidFill>
-                        <a:effectLst/>
-                        <a:latin typeface="Calibri" panose="020F0502020204030204" pitchFamily="34" charset="0"/>
-                        <a:ea typeface="Calibri" panose="020F0502020204030204" pitchFamily="34" charset="0"/>
-                        <a:cs typeface="Times New Roman" panose="02020603050405020304" pitchFamily="18" charset="0"/>
-                      </a:endParaRPr>
-                    </a:p>
-                  </a:txBody>
-                  <a:tcPr marL="68580" marR="68580" marT="0" marB="0" anchor="ctr"/>
-                </a:tc>
-                <a:extLst>
-                  <a:ext uri="{0D108BD9-81ED-4DB2-BD59-A6C34878D82A}">
-                    <a16:rowId xmlns:a16="http://schemas.microsoft.com/office/drawing/2014/main" val="201965972"/>
-                  </a:ext>
-                </a:extLst>
-              </a:tr>
-              <a:tr h="365760">
-                <a:tc>
-                  <a:txBody>
-                    <a:bodyPr/>
-                    <a:lstStyle/>
-                    <a:p>
-                      <a:pPr marL="0" marR="0" indent="0" algn="ctr">
-                        <a:spcBef>
-                          <a:spcPts val="0"/>
-                        </a:spcBef>
-                        <a:spcAft>
-                          <a:spcPts val="0"/>
-                        </a:spcAft>
-                      </a:pPr>
-                      <a:r>
-                        <a:rPr lang="en-GB" sz="900">
-                          <a:effectLst/>
-                        </a:rPr>
-                        <a:t>S5: Misdetection</a:t>
-                      </a:r>
-                      <a:endParaRPr lang="en-US" sz="1100">
-                        <a:solidFill>
-                          <a:srgbClr val="000000"/>
-                        </a:solidFill>
-                        <a:effectLst/>
-                        <a:latin typeface="Calibri" panose="020F0502020204030204" pitchFamily="34" charset="0"/>
-                        <a:ea typeface="Calibri" panose="020F0502020204030204" pitchFamily="34" charset="0"/>
-                        <a:cs typeface="Times New Roman" panose="02020603050405020304" pitchFamily="18" charset="0"/>
-                      </a:endParaRPr>
-                    </a:p>
-                  </a:txBody>
-                  <a:tcPr marL="68580" marR="68580" marT="0" marB="0" anchor="ctr"/>
-                </a:tc>
-                <a:tc>
-                  <a:txBody>
-                    <a:bodyPr/>
-                    <a:lstStyle/>
-                    <a:p>
-                      <a:pPr marL="0" marR="0" indent="0" algn="ctr">
-                        <a:spcBef>
-                          <a:spcPts val="0"/>
-                        </a:spcBef>
-                        <a:spcAft>
-                          <a:spcPts val="0"/>
-                        </a:spcAft>
-                      </a:pPr>
-                      <a:r>
-                        <a:rPr lang="en-GB" sz="900">
-                          <a:effectLst/>
-                        </a:rPr>
-                        <a:t>3000</a:t>
-                      </a:r>
-                      <a:endParaRPr lang="en-US" sz="1100">
-                        <a:solidFill>
-                          <a:srgbClr val="000000"/>
-                        </a:solidFill>
-                        <a:effectLst/>
-                        <a:latin typeface="Calibri" panose="020F0502020204030204" pitchFamily="34" charset="0"/>
-                        <a:ea typeface="Calibri" panose="020F0502020204030204" pitchFamily="34" charset="0"/>
-                        <a:cs typeface="Times New Roman" panose="02020603050405020304" pitchFamily="18" charset="0"/>
-                      </a:endParaRPr>
-                    </a:p>
-                  </a:txBody>
-                  <a:tcPr marL="68580" marR="68580" marT="0" marB="0" anchor="ctr"/>
-                </a:tc>
-                <a:tc>
-                  <a:txBody>
-                    <a:bodyPr/>
-                    <a:lstStyle/>
-                    <a:p>
-                      <a:pPr marL="0" marR="0" indent="0" algn="ctr">
-                        <a:spcBef>
-                          <a:spcPts val="0"/>
-                        </a:spcBef>
-                        <a:spcAft>
-                          <a:spcPts val="0"/>
-                        </a:spcAft>
-                      </a:pPr>
-                      <a:r>
-                        <a:rPr lang="en-GB" sz="900">
-                          <a:effectLst/>
-                        </a:rPr>
-                        <a:t>8</a:t>
-                      </a:r>
-                      <a:endParaRPr lang="en-US" sz="1100">
-                        <a:solidFill>
-                          <a:srgbClr val="000000"/>
-                        </a:solidFill>
-                        <a:effectLst/>
-                        <a:latin typeface="Calibri" panose="020F0502020204030204" pitchFamily="34" charset="0"/>
-                        <a:ea typeface="Calibri" panose="020F0502020204030204" pitchFamily="34" charset="0"/>
-                        <a:cs typeface="Times New Roman" panose="02020603050405020304" pitchFamily="18" charset="0"/>
-                      </a:endParaRPr>
-                    </a:p>
-                  </a:txBody>
-                  <a:tcPr marL="68580" marR="68580" marT="0" marB="0" anchor="ctr"/>
-                </a:tc>
-                <a:tc>
-                  <a:txBody>
-                    <a:bodyPr/>
-                    <a:lstStyle/>
-                    <a:p>
-                      <a:pPr marL="0" marR="0" indent="0" algn="ctr">
-                        <a:spcBef>
-                          <a:spcPts val="0"/>
-                        </a:spcBef>
-                        <a:spcAft>
-                          <a:spcPts val="0"/>
-                        </a:spcAft>
-                      </a:pPr>
-                      <a:r>
-                        <a:rPr lang="en-GB" sz="900">
-                          <a:effectLst/>
-                        </a:rPr>
-                        <a:t>no</a:t>
-                      </a:r>
-                      <a:endParaRPr lang="en-US" sz="1100">
-                        <a:solidFill>
-                          <a:srgbClr val="000000"/>
-                        </a:solidFill>
-                        <a:effectLst/>
-                        <a:latin typeface="Calibri" panose="020F0502020204030204" pitchFamily="34" charset="0"/>
-                        <a:ea typeface="Calibri" panose="020F0502020204030204" pitchFamily="34" charset="0"/>
-                        <a:cs typeface="Times New Roman" panose="02020603050405020304" pitchFamily="18" charset="0"/>
-                      </a:endParaRPr>
-                    </a:p>
-                  </a:txBody>
-                  <a:tcPr marL="68580" marR="68580" marT="0" marB="0" anchor="ctr"/>
-                </a:tc>
-                <a:tc>
-                  <a:txBody>
-                    <a:bodyPr/>
-                    <a:lstStyle/>
-                    <a:p>
-                      <a:pPr marL="0" marR="0" indent="0" algn="ctr">
-                        <a:spcBef>
-                          <a:spcPts val="0"/>
-                        </a:spcBef>
-                        <a:spcAft>
-                          <a:spcPts val="0"/>
-                        </a:spcAft>
-                      </a:pPr>
-                      <a:r>
-                        <a:rPr lang="en-GB" sz="900" dirty="0">
-                          <a:effectLst/>
-                        </a:rPr>
-                        <a:t>10% of presences randomly turned into absences</a:t>
-                      </a:r>
-                      <a:endParaRPr lang="en-US" sz="1100" dirty="0">
-                        <a:solidFill>
-                          <a:srgbClr val="000000"/>
-                        </a:solidFill>
-                        <a:effectLst/>
-                        <a:latin typeface="Calibri" panose="020F0502020204030204" pitchFamily="34" charset="0"/>
-                        <a:ea typeface="Calibri" panose="020F0502020204030204" pitchFamily="34" charset="0"/>
-                        <a:cs typeface="Times New Roman" panose="02020603050405020304" pitchFamily="18" charset="0"/>
-                      </a:endParaRPr>
-                    </a:p>
-                  </a:txBody>
-                  <a:tcPr marL="68580" marR="68580" marT="0" marB="0" anchor="ctr"/>
-                </a:tc>
-                <a:tc>
-                  <a:txBody>
-                    <a:bodyPr/>
-                    <a:lstStyle/>
-                    <a:p>
-                      <a:pPr marL="0" marR="0" indent="0" algn="ctr">
-                        <a:spcBef>
-                          <a:spcPts val="0"/>
-                        </a:spcBef>
-                        <a:spcAft>
-                          <a:spcPts val="0"/>
-                        </a:spcAft>
-                      </a:pPr>
-                      <a:r>
-                        <a:rPr lang="en-GB" sz="900">
-                          <a:effectLst/>
-                        </a:rPr>
-                        <a:t>no</a:t>
-                      </a:r>
-                      <a:endParaRPr lang="en-US" sz="1100">
-                        <a:solidFill>
-                          <a:srgbClr val="000000"/>
-                        </a:solidFill>
-                        <a:effectLst/>
-                        <a:latin typeface="Calibri" panose="020F0502020204030204" pitchFamily="34" charset="0"/>
-                        <a:ea typeface="Calibri" panose="020F0502020204030204" pitchFamily="34" charset="0"/>
-                        <a:cs typeface="Times New Roman" panose="02020603050405020304" pitchFamily="18" charset="0"/>
-                      </a:endParaRPr>
-                    </a:p>
-                  </a:txBody>
-                  <a:tcPr marL="68580" marR="68580" marT="0" marB="0" anchor="ctr"/>
-                </a:tc>
-                <a:extLst>
-                  <a:ext uri="{0D108BD9-81ED-4DB2-BD59-A6C34878D82A}">
-                    <a16:rowId xmlns:a16="http://schemas.microsoft.com/office/drawing/2014/main" val="1861634310"/>
-                  </a:ext>
-                </a:extLst>
-              </a:tr>
-              <a:tr h="274320">
-                <a:tc>
-                  <a:txBody>
-                    <a:bodyPr/>
-                    <a:lstStyle/>
-                    <a:p>
-                      <a:pPr marL="0" marR="0" indent="0" algn="ctr">
-                        <a:spcBef>
-                          <a:spcPts val="0"/>
-                        </a:spcBef>
-                        <a:spcAft>
-                          <a:spcPts val="0"/>
-                        </a:spcAft>
-                      </a:pPr>
-                      <a:r>
-                        <a:rPr lang="en-GB" sz="900">
-                          <a:effectLst/>
-                        </a:rPr>
-                        <a:t>S6: Absences due to dispersal limitation</a:t>
-                      </a:r>
-                      <a:endParaRPr lang="en-US" sz="1100">
-                        <a:solidFill>
-                          <a:srgbClr val="000000"/>
-                        </a:solidFill>
-                        <a:effectLst/>
-                        <a:latin typeface="Calibri" panose="020F0502020204030204" pitchFamily="34" charset="0"/>
-                        <a:ea typeface="Calibri" panose="020F0502020204030204" pitchFamily="34" charset="0"/>
-                        <a:cs typeface="Times New Roman" panose="02020603050405020304" pitchFamily="18" charset="0"/>
-                      </a:endParaRPr>
-                    </a:p>
-                  </a:txBody>
-                  <a:tcPr marL="68580" marR="68580" marT="0" marB="0" anchor="ctr"/>
-                </a:tc>
-                <a:tc>
-                  <a:txBody>
-                    <a:bodyPr/>
-                    <a:lstStyle/>
-                    <a:p>
-                      <a:pPr marL="0" marR="0" indent="0" algn="ctr">
-                        <a:spcBef>
-                          <a:spcPts val="0"/>
-                        </a:spcBef>
-                        <a:spcAft>
-                          <a:spcPts val="0"/>
-                        </a:spcAft>
-                      </a:pPr>
-                      <a:r>
-                        <a:rPr lang="en-GB" sz="900">
-                          <a:effectLst/>
-                        </a:rPr>
-                        <a:t>3000</a:t>
-                      </a:r>
-                      <a:endParaRPr lang="en-US" sz="1100">
-                        <a:solidFill>
-                          <a:srgbClr val="000000"/>
-                        </a:solidFill>
-                        <a:effectLst/>
-                        <a:latin typeface="Calibri" panose="020F0502020204030204" pitchFamily="34" charset="0"/>
-                        <a:ea typeface="Calibri" panose="020F0502020204030204" pitchFamily="34" charset="0"/>
-                        <a:cs typeface="Times New Roman" panose="02020603050405020304" pitchFamily="18" charset="0"/>
-                      </a:endParaRPr>
-                    </a:p>
-                  </a:txBody>
-                  <a:tcPr marL="68580" marR="68580" marT="0" marB="0" anchor="ctr"/>
-                </a:tc>
-                <a:tc>
-                  <a:txBody>
-                    <a:bodyPr/>
-                    <a:lstStyle/>
-                    <a:p>
-                      <a:pPr marL="0" marR="0" indent="0" algn="ctr">
-                        <a:spcBef>
-                          <a:spcPts val="0"/>
-                        </a:spcBef>
-                        <a:spcAft>
-                          <a:spcPts val="0"/>
-                        </a:spcAft>
-                      </a:pPr>
-                      <a:r>
-                        <a:rPr lang="en-GB" sz="900">
-                          <a:effectLst/>
-                        </a:rPr>
-                        <a:t>8</a:t>
-                      </a:r>
-                      <a:endParaRPr lang="en-US" sz="1100">
-                        <a:solidFill>
-                          <a:srgbClr val="000000"/>
-                        </a:solidFill>
-                        <a:effectLst/>
-                        <a:latin typeface="Calibri" panose="020F0502020204030204" pitchFamily="34" charset="0"/>
-                        <a:ea typeface="Calibri" panose="020F0502020204030204" pitchFamily="34" charset="0"/>
-                        <a:cs typeface="Times New Roman" panose="02020603050405020304" pitchFamily="18" charset="0"/>
-                      </a:endParaRPr>
-                    </a:p>
-                  </a:txBody>
-                  <a:tcPr marL="68580" marR="68580" marT="0" marB="0" anchor="ctr"/>
-                </a:tc>
-                <a:tc>
-                  <a:txBody>
-                    <a:bodyPr/>
-                    <a:lstStyle/>
-                    <a:p>
-                      <a:pPr marL="0" marR="0" indent="0" algn="ctr">
-                        <a:spcBef>
-                          <a:spcPts val="0"/>
-                        </a:spcBef>
-                        <a:spcAft>
-                          <a:spcPts val="0"/>
-                        </a:spcAft>
-                      </a:pPr>
-                      <a:r>
-                        <a:rPr lang="en-GB" sz="900">
-                          <a:effectLst/>
-                        </a:rPr>
-                        <a:t>no</a:t>
-                      </a:r>
-                      <a:endParaRPr lang="en-US" sz="1100">
-                        <a:solidFill>
-                          <a:srgbClr val="000000"/>
-                        </a:solidFill>
-                        <a:effectLst/>
-                        <a:latin typeface="Calibri" panose="020F0502020204030204" pitchFamily="34" charset="0"/>
-                        <a:ea typeface="Calibri" panose="020F0502020204030204" pitchFamily="34" charset="0"/>
-                        <a:cs typeface="Times New Roman" panose="02020603050405020304" pitchFamily="18" charset="0"/>
-                      </a:endParaRPr>
-                    </a:p>
-                  </a:txBody>
-                  <a:tcPr marL="68580" marR="68580" marT="0" marB="0" anchor="ctr"/>
-                </a:tc>
-                <a:tc>
-                  <a:txBody>
-                    <a:bodyPr/>
-                    <a:lstStyle/>
-                    <a:p>
-                      <a:pPr marL="0" marR="0" indent="0" algn="ctr">
-                        <a:spcBef>
-                          <a:spcPts val="0"/>
-                        </a:spcBef>
-                        <a:spcAft>
-                          <a:spcPts val="0"/>
-                        </a:spcAft>
-                      </a:pPr>
-                      <a:r>
-                        <a:rPr lang="en-GB" sz="900">
-                          <a:effectLst/>
-                        </a:rPr>
-                        <a:t>no</a:t>
-                      </a:r>
-                      <a:endParaRPr lang="en-US" sz="1100">
-                        <a:solidFill>
-                          <a:srgbClr val="000000"/>
-                        </a:solidFill>
-                        <a:effectLst/>
-                        <a:latin typeface="Calibri" panose="020F0502020204030204" pitchFamily="34" charset="0"/>
-                        <a:ea typeface="Calibri" panose="020F0502020204030204" pitchFamily="34" charset="0"/>
-                        <a:cs typeface="Times New Roman" panose="02020603050405020304" pitchFamily="18" charset="0"/>
-                      </a:endParaRPr>
-                    </a:p>
-                  </a:txBody>
-                  <a:tcPr marL="68580" marR="68580" marT="0" marB="0" anchor="ctr"/>
-                </a:tc>
-                <a:tc>
-                  <a:txBody>
-                    <a:bodyPr/>
-                    <a:lstStyle/>
-                    <a:p>
-                      <a:pPr marL="0" marR="0" indent="0" algn="ctr">
-                        <a:spcBef>
-                          <a:spcPts val="0"/>
-                        </a:spcBef>
-                        <a:spcAft>
-                          <a:spcPts val="0"/>
-                        </a:spcAft>
-                      </a:pPr>
-                      <a:r>
-                        <a:rPr lang="en-GB" sz="900" dirty="0">
-                          <a:effectLst/>
-                        </a:rPr>
-                        <a:t>yes</a:t>
-                      </a:r>
-                      <a:endParaRPr lang="en-US" sz="1100" dirty="0">
-                        <a:solidFill>
-                          <a:srgbClr val="000000"/>
-                        </a:solidFill>
-                        <a:effectLst/>
-                        <a:latin typeface="Calibri" panose="020F0502020204030204" pitchFamily="34" charset="0"/>
-                        <a:ea typeface="Calibri" panose="020F0502020204030204" pitchFamily="34" charset="0"/>
-                        <a:cs typeface="Times New Roman" panose="02020603050405020304" pitchFamily="18" charset="0"/>
-                      </a:endParaRPr>
-                    </a:p>
-                  </a:txBody>
-                  <a:tcPr marL="68580" marR="68580" marT="0" marB="0" anchor="ctr"/>
-                </a:tc>
-                <a:extLst>
-                  <a:ext uri="{0D108BD9-81ED-4DB2-BD59-A6C34878D82A}">
-                    <a16:rowId xmlns:a16="http://schemas.microsoft.com/office/drawing/2014/main" val="1315797366"/>
-                  </a:ext>
-                </a:extLst>
-              </a:tr>
-            </a:tbl>
-          </a:graphicData>
-        </a:graphic>
-      </p:graphicFrame>
-    </p:spTree>
-    <p:extLst>
-      <p:ext uri="{BB962C8B-B14F-4D97-AF65-F5344CB8AC3E}">
-        <p14:creationId xmlns:p14="http://schemas.microsoft.com/office/powerpoint/2010/main" val="891167153"/>
-      </p:ext>
-    </p:extLst>
-  </p:cSld>
-  <p:clrMapOvr>
-    <a:masterClrMapping/>
-  </p:clrMapOvr>
-</p:sld>
-</file>
-
-<file path=ppt/slides/slide3.xml><?xml version="1.0" encoding="utf-8"?>
-<p:sld xmlns:a="http://schemas.openxmlformats.org/drawingml/2006/main" xmlns:r="http://schemas.openxmlformats.org/officeDocument/2006/relationships" xmlns:p="http://schemas.openxmlformats.org/presentationml/2006/main">
-  <p:cSld>
-    <p:spTree>
-      <p:nvGrpSpPr>
-        <p:cNvPr id="1" name=""/>
-        <p:cNvGrpSpPr/>
-        <p:nvPr/>
-      </p:nvGrpSpPr>
-      <p:grpSpPr>
-        <a:xfrm>
-          <a:off x="0" y="0"/>
-          <a:ext cx="0" cy="0"/>
-          <a:chOff x="0" y="0"/>
-          <a:chExt cx="0" cy="0"/>
-        </a:xfrm>
-      </p:grpSpPr>
-      <p:sp>
-        <p:nvSpPr>
-          <p:cNvPr id="2" name="Title 1"/>
-          <p:cNvSpPr>
-            <a:spLocks noGrp="1"/>
-          </p:cNvSpPr>
-          <p:nvPr>
-            <p:ph type="title"/>
-          </p:nvPr>
-        </p:nvSpPr>
-        <p:spPr/>
-        <p:txBody>
-          <a:bodyPr/>
-          <a:lstStyle/>
-          <a:p>
-            <a:r>
-              <a:rPr lang="en-US" dirty="0" smtClean="0"/>
-              <a:t>Continuous degradation of data</a:t>
-            </a:r>
-            <a:endParaRPr lang="en-US" dirty="0"/>
-          </a:p>
-        </p:txBody>
-      </p:sp>
-      <p:graphicFrame>
-        <p:nvGraphicFramePr>
-          <p:cNvPr id="4" name="Content Placeholder 3"/>
-          <p:cNvGraphicFramePr>
-            <a:graphicFrameLocks noGrp="1"/>
-          </p:cNvGraphicFramePr>
-          <p:nvPr>
-            <p:ph idx="1"/>
             <p:extLst>
               <p:ext uri="{D42A27DB-BD31-4B8C-83A1-F6EECF244321}">
-                <p14:modId xmlns:p14="http://schemas.microsoft.com/office/powerpoint/2010/main" val="2950207993"/>
+                <p14:modId xmlns:p14="http://schemas.microsoft.com/office/powerpoint/2010/main" val="3974496239"/>
               </p:ext>
             </p:extLst>
           </p:nvPr>
         </p:nvGraphicFramePr>
         <p:xfrm>
           <a:off x="1589313" y="1386961"/>
-          <a:ext cx="8321041" cy="4399280"/>
+          <a:ext cx="8321041" cy="4124960"/>
         </p:xfrm>
         <a:graphic>
           <a:graphicData uri="http://schemas.openxmlformats.org/drawingml/2006/table">
@@ -4748,7 +3180,17 @@
                       <a:endParaRPr lang="en-US" dirty="0"/>
                     </a:p>
                   </a:txBody>
-                  <a:tcPr/>
+                  <a:tcPr>
+                    <a:lnR w="38100" cap="flat" cmpd="sng" algn="ctr">
+                      <a:solidFill>
+                        <a:schemeClr val="bg1"/>
+                      </a:solidFill>
+                      <a:prstDash val="solid"/>
+                      <a:round/>
+                      <a:headEnd type="none" w="med" len="med"/>
+                      <a:tailEnd type="none" w="med" len="med"/>
+                    </a:lnR>
+                  </a:tcPr>
                 </a:tc>
                 <a:tc>
                   <a:txBody>
@@ -4762,7 +3204,35 @@
                       <a:endParaRPr lang="en-US" dirty="0"/>
                     </a:p>
                   </a:txBody>
-                  <a:tcPr/>
+                  <a:tcPr>
+                    <a:lnL w="38100" cap="flat" cmpd="sng" algn="ctr">
+                      <a:solidFill>
+                        <a:schemeClr val="bg1"/>
+                      </a:solidFill>
+                      <a:prstDash val="solid"/>
+                      <a:round/>
+                      <a:headEnd type="none" w="med" len="med"/>
+                      <a:tailEnd type="none" w="med" len="med"/>
+                    </a:lnL>
+                    <a:lnR w="38100" cap="flat" cmpd="sng" algn="ctr">
+                      <a:solidFill>
+                        <a:schemeClr val="bg1"/>
+                      </a:solidFill>
+                      <a:prstDash val="solid"/>
+                      <a:round/>
+                      <a:headEnd type="none" w="med" len="med"/>
+                      <a:tailEnd type="none" w="med" len="med"/>
+                    </a:lnR>
+                    <a:lnT w="12700" cap="flat" cmpd="sng" algn="ctr">
+                      <a:solidFill>
+                        <a:schemeClr val="bg1"/>
+                      </a:solidFill>
+                      <a:prstDash val="solid"/>
+                      <a:round/>
+                      <a:headEnd type="none" w="med" len="med"/>
+                      <a:tailEnd type="none" w="med" len="med"/>
+                    </a:lnT>
+                  </a:tcPr>
                 </a:tc>
                 <a:tc>
                   <a:txBody>
@@ -4776,7 +3246,17 @@
                       <a:endParaRPr lang="en-US" dirty="0"/>
                     </a:p>
                   </a:txBody>
-                  <a:tcPr/>
+                  <a:tcPr>
+                    <a:lnL w="38100" cap="flat" cmpd="sng" algn="ctr">
+                      <a:solidFill>
+                        <a:schemeClr val="bg1"/>
+                      </a:solidFill>
+                      <a:prstDash val="solid"/>
+                      <a:round/>
+                      <a:headEnd type="none" w="med" len="med"/>
+                      <a:tailEnd type="none" w="med" len="med"/>
+                    </a:lnL>
+                  </a:tcPr>
                 </a:tc>
                 <a:tc>
                   <a:txBody>
@@ -4834,12 +3314,22 @@
                     <a:p>
                       <a:r>
                         <a:rPr lang="en-US" dirty="0" smtClean="0"/>
-                        <a:t>2250</a:t>
+                        <a:t>2000</a:t>
                       </a:r>
                       <a:endParaRPr lang="en-US" dirty="0"/>
                     </a:p>
                   </a:txBody>
-                  <a:tcPr/>
+                  <a:tcPr>
+                    <a:lnR w="38100" cap="flat" cmpd="sng" algn="ctr">
+                      <a:solidFill>
+                        <a:schemeClr val="bg1"/>
+                      </a:solidFill>
+                      <a:prstDash val="solid"/>
+                      <a:round/>
+                      <a:headEnd type="none" w="med" len="med"/>
+                      <a:tailEnd type="none" w="med" len="med"/>
+                    </a:lnR>
+                  </a:tcPr>
                 </a:tc>
                 <a:tc>
                   <a:txBody>
@@ -4848,12 +3338,31 @@
                     <a:p>
                       <a:r>
                         <a:rPr lang="en-US" dirty="0" smtClean="0"/>
-                        <a:t>1500</a:t>
+                        <a:t>1000</a:t>
                       </a:r>
                       <a:endParaRPr lang="en-US" dirty="0"/>
                     </a:p>
                   </a:txBody>
-                  <a:tcPr/>
+                  <a:tcPr>
+                    <a:lnL w="38100" cap="flat" cmpd="sng" algn="ctr">
+                      <a:solidFill>
+                        <a:schemeClr val="bg1"/>
+                      </a:solidFill>
+                      <a:prstDash val="solid"/>
+                      <a:round/>
+                      <a:headEnd type="none" w="med" len="med"/>
+                      <a:tailEnd type="none" w="med" len="med"/>
+                    </a:lnL>
+                    <a:lnR w="38100" cap="flat" cmpd="sng" algn="ctr">
+                      <a:solidFill>
+                        <a:schemeClr val="bg1"/>
+                      </a:solidFill>
+                      <a:prstDash val="solid"/>
+                      <a:round/>
+                      <a:headEnd type="none" w="med" len="med"/>
+                      <a:tailEnd type="none" w="med" len="med"/>
+                    </a:lnR>
+                  </a:tcPr>
                 </a:tc>
                 <a:tc>
                   <a:txBody>
@@ -4862,12 +3371,22 @@
                     <a:p>
                       <a:r>
                         <a:rPr lang="en-US" dirty="0" smtClean="0"/>
-                        <a:t>750</a:t>
+                        <a:t>500</a:t>
                       </a:r>
                       <a:endParaRPr lang="en-US" dirty="0"/>
                     </a:p>
                   </a:txBody>
-                  <a:tcPr/>
+                  <a:tcPr>
+                    <a:lnL w="38100" cap="flat" cmpd="sng" algn="ctr">
+                      <a:solidFill>
+                        <a:schemeClr val="bg1"/>
+                      </a:solidFill>
+                      <a:prstDash val="solid"/>
+                      <a:round/>
+                      <a:headEnd type="none" w="med" len="med"/>
+                      <a:tailEnd type="none" w="med" len="med"/>
+                    </a:lnL>
+                  </a:tcPr>
                 </a:tc>
                 <a:tc>
                   <a:txBody>
@@ -4897,7 +3416,23 @@
                       </a:r>
                       <a:r>
                         <a:rPr lang="en-US" dirty="0" smtClean="0"/>
-                        <a:t> of predictors</a:t>
+                        <a:t> </a:t>
+                      </a:r>
+                      <a:r>
+                        <a:rPr lang="en-US" dirty="0" smtClean="0"/>
+                        <a:t>of</a:t>
+                      </a:r>
+                      <a:r>
+                        <a:rPr lang="en-US" baseline="0" dirty="0" smtClean="0"/>
+                        <a:t> missing</a:t>
+                      </a:r>
+                      <a:r>
+                        <a:rPr lang="en-US" dirty="0" smtClean="0"/>
+                        <a:t> </a:t>
+                      </a:r>
+                      <a:r>
+                        <a:rPr lang="en-US" dirty="0" smtClean="0"/>
+                        <a:t>predictors</a:t>
                       </a:r>
                     </a:p>
                   </a:txBody>
@@ -4910,7 +3445,7 @@
                     <a:p>
                       <a:r>
                         <a:rPr lang="en-US" dirty="0" smtClean="0"/>
-                        <a:t>8</a:t>
+                        <a:t>0</a:t>
                       </a:r>
                       <a:endParaRPr lang="en-US" dirty="0"/>
                     </a:p>
@@ -4924,12 +3459,22 @@
                     <a:p>
                       <a:r>
                         <a:rPr lang="en-US" dirty="0" smtClean="0"/>
-                        <a:t>6</a:t>
+                        <a:t>2</a:t>
                       </a:r>
                       <a:endParaRPr lang="en-US" dirty="0"/>
                     </a:p>
                   </a:txBody>
-                  <a:tcPr/>
+                  <a:tcPr>
+                    <a:lnR w="38100" cap="flat" cmpd="sng" algn="ctr">
+                      <a:solidFill>
+                        <a:schemeClr val="bg1"/>
+                      </a:solidFill>
+                      <a:prstDash val="solid"/>
+                      <a:round/>
+                      <a:headEnd type="none" w="med" len="med"/>
+                      <a:tailEnd type="none" w="med" len="med"/>
+                    </a:lnR>
+                  </a:tcPr>
                 </a:tc>
                 <a:tc>
                   <a:txBody>
@@ -4943,7 +3488,26 @@
                       <a:endParaRPr lang="en-US" dirty="0"/>
                     </a:p>
                   </a:txBody>
-                  <a:tcPr/>
+                  <a:tcPr>
+                    <a:lnL w="38100" cap="flat" cmpd="sng" algn="ctr">
+                      <a:solidFill>
+                        <a:schemeClr val="bg1"/>
+                      </a:solidFill>
+                      <a:prstDash val="solid"/>
+                      <a:round/>
+                      <a:headEnd type="none" w="med" len="med"/>
+                      <a:tailEnd type="none" w="med" len="med"/>
+                    </a:lnL>
+                    <a:lnR w="38100" cap="flat" cmpd="sng" algn="ctr">
+                      <a:solidFill>
+                        <a:schemeClr val="bg1"/>
+                      </a:solidFill>
+                      <a:prstDash val="solid"/>
+                      <a:round/>
+                      <a:headEnd type="none" w="med" len="med"/>
+                      <a:tailEnd type="none" w="med" len="med"/>
+                    </a:lnR>
+                  </a:tcPr>
                 </a:tc>
                 <a:tc>
                   <a:txBody>
@@ -4952,12 +3516,22 @@
                     <a:p>
                       <a:r>
                         <a:rPr lang="en-US" dirty="0" smtClean="0"/>
-                        <a:t>2</a:t>
+                        <a:t>6</a:t>
                       </a:r>
                       <a:endParaRPr lang="en-US" dirty="0"/>
                     </a:p>
                   </a:txBody>
-                  <a:tcPr/>
+                  <a:tcPr>
+                    <a:lnL w="38100" cap="flat" cmpd="sng" algn="ctr">
+                      <a:solidFill>
+                        <a:schemeClr val="bg1"/>
+                      </a:solidFill>
+                      <a:prstDash val="solid"/>
+                      <a:round/>
+                      <a:headEnd type="none" w="med" len="med"/>
+                      <a:tailEnd type="none" w="med" len="med"/>
+                    </a:lnL>
+                  </a:tcPr>
                 </a:tc>
                 <a:tc>
                   <a:txBody>
@@ -5065,7 +3639,17 @@
                       <a:endParaRPr lang="en-US" dirty="0"/>
                     </a:p>
                   </a:txBody>
-                  <a:tcPr/>
+                  <a:tcPr>
+                    <a:lnR w="38100" cap="flat" cmpd="sng" algn="ctr">
+                      <a:solidFill>
+                        <a:schemeClr val="bg1"/>
+                      </a:solidFill>
+                      <a:prstDash val="solid"/>
+                      <a:round/>
+                      <a:headEnd type="none" w="med" len="med"/>
+                      <a:tailEnd type="none" w="med" len="med"/>
+                    </a:lnR>
+                  </a:tcPr>
                 </a:tc>
                 <a:tc>
                   <a:txBody>
@@ -5079,7 +3663,26 @@
                       <a:endParaRPr lang="en-US" dirty="0"/>
                     </a:p>
                   </a:txBody>
-                  <a:tcPr/>
+                  <a:tcPr>
+                    <a:lnL w="38100" cap="flat" cmpd="sng" algn="ctr">
+                      <a:solidFill>
+                        <a:schemeClr val="bg1"/>
+                      </a:solidFill>
+                      <a:prstDash val="solid"/>
+                      <a:round/>
+                      <a:headEnd type="none" w="med" len="med"/>
+                      <a:tailEnd type="none" w="med" len="med"/>
+                    </a:lnL>
+                    <a:lnR w="38100" cap="flat" cmpd="sng" algn="ctr">
+                      <a:solidFill>
+                        <a:schemeClr val="bg1"/>
+                      </a:solidFill>
+                      <a:prstDash val="solid"/>
+                      <a:round/>
+                      <a:headEnd type="none" w="med" len="med"/>
+                      <a:tailEnd type="none" w="med" len="med"/>
+                    </a:lnR>
+                  </a:tcPr>
                 </a:tc>
                 <a:tc>
                   <a:txBody>
@@ -5093,14 +3696,24 @@
                       <a:endParaRPr lang="en-US" dirty="0"/>
                     </a:p>
                   </a:txBody>
-                  <a:tcPr/>
+                  <a:tcPr>
+                    <a:lnL w="38100" cap="flat" cmpd="sng" algn="ctr">
+                      <a:solidFill>
+                        <a:schemeClr val="bg1"/>
+                      </a:solidFill>
+                      <a:prstDash val="solid"/>
+                      <a:round/>
+                      <a:headEnd type="none" w="med" len="med"/>
+                      <a:tailEnd type="none" w="med" len="med"/>
+                    </a:lnL>
+                  </a:tcPr>
                 </a:tc>
                 <a:tc>
                   <a:txBody>
                     <a:bodyPr/>
                     <a:lstStyle/>
                     <a:p>
-                      <a:endParaRPr lang="en-US"/>
+                      <a:endParaRPr lang="en-US" dirty="0"/>
                     </a:p>
                   </a:txBody>
                   <a:tcPr/>
@@ -5168,7 +3781,17 @@
                       </a:endParaRPr>
                     </a:p>
                   </a:txBody>
-                  <a:tcPr/>
+                  <a:tcPr>
+                    <a:lnB w="12700" cap="flat" cmpd="sng" algn="ctr">
+                      <a:solidFill>
+                        <a:schemeClr val="tx1"/>
+                      </a:solidFill>
+                      <a:prstDash val="solid"/>
+                      <a:round/>
+                      <a:headEnd type="none" w="med" len="med"/>
+                      <a:tailEnd type="none" w="med" len="med"/>
+                    </a:lnB>
+                  </a:tcPr>
                 </a:tc>
                 <a:tc>
                   <a:txBody>
@@ -5182,7 +3805,17 @@
                       <a:endParaRPr lang="en-US" dirty="0"/>
                     </a:p>
                   </a:txBody>
-                  <a:tcPr/>
+                  <a:tcPr>
+                    <a:lnB w="12700" cap="flat" cmpd="sng" algn="ctr">
+                      <a:solidFill>
+                        <a:schemeClr val="tx1"/>
+                      </a:solidFill>
+                      <a:prstDash val="solid"/>
+                      <a:round/>
+                      <a:headEnd type="none" w="med" len="med"/>
+                      <a:tailEnd type="none" w="med" len="med"/>
+                    </a:lnB>
+                  </a:tcPr>
                 </a:tc>
                 <a:tc>
                   <a:txBody>
@@ -5191,12 +3824,31 @@
                     <a:p>
                       <a:r>
                         <a:rPr lang="en-US" dirty="0" smtClean="0"/>
-                        <a:t>5</a:t>
+                        <a:t>15</a:t>
                       </a:r>
                       <a:endParaRPr lang="en-US" dirty="0"/>
                     </a:p>
                   </a:txBody>
-                  <a:tcPr/>
+                  <a:tcPr>
+                    <a:lnR w="38100" cap="flat" cmpd="sng" algn="ctr">
+                      <a:solidFill>
+                        <a:schemeClr val="bg1"/>
+                      </a:solidFill>
+                      <a:prstDash val="solid"/>
+                      <a:round/>
+                      <a:headEnd type="none" w="med" len="med"/>
+                      <a:tailEnd type="none" w="med" len="med"/>
+                    </a:lnR>
+                    <a:lnB w="12700" cap="flat" cmpd="sng" algn="ctr">
+                      <a:solidFill>
+                        <a:schemeClr val="tx1"/>
+                      </a:solidFill>
+                      <a:prstDash val="solid"/>
+                      <a:round/>
+                      <a:headEnd type="none" w="med" len="med"/>
+                      <a:tailEnd type="none" w="med" len="med"/>
+                    </a:lnB>
+                  </a:tcPr>
                 </a:tc>
                 <a:tc>
                   <a:txBody>
@@ -5205,12 +3857,40 @@
                     <a:p>
                       <a:r>
                         <a:rPr lang="en-US" dirty="0" smtClean="0"/>
-                        <a:t>10</a:t>
+                        <a:t>30</a:t>
                       </a:r>
                       <a:endParaRPr lang="en-US" dirty="0"/>
                     </a:p>
                   </a:txBody>
-                  <a:tcPr/>
+                  <a:tcPr>
+                    <a:lnL w="38100" cap="flat" cmpd="sng" algn="ctr">
+                      <a:solidFill>
+                        <a:schemeClr val="bg1"/>
+                      </a:solidFill>
+                      <a:prstDash val="solid"/>
+                      <a:round/>
+                      <a:headEnd type="none" w="med" len="med"/>
+                      <a:tailEnd type="none" w="med" len="med"/>
+                    </a:lnL>
+                    <a:lnR w="38100" cap="flat" cmpd="sng" algn="ctr">
+                      <a:solidFill>
+                        <a:schemeClr val="bg1"/>
+                      </a:solidFill>
+                      <a:prstDash val="solid"/>
+                      <a:round/>
+                      <a:headEnd type="none" w="med" len="med"/>
+                      <a:tailEnd type="none" w="med" len="med"/>
+                    </a:lnR>
+                    <a:lnB w="12700" cap="flat" cmpd="sng" algn="ctr">
+                      <a:solidFill>
+                        <a:schemeClr val="tx1"/>
+                      </a:solidFill>
+                      <a:prstDash val="solid"/>
+                      <a:round/>
+                      <a:headEnd type="none" w="med" len="med"/>
+                      <a:tailEnd type="none" w="med" len="med"/>
+                    </a:lnB>
+                  </a:tcPr>
                 </a:tc>
                 <a:tc>
                   <a:txBody>
@@ -5219,12 +3899,31 @@
                     <a:p>
                       <a:r>
                         <a:rPr lang="en-US" dirty="0" smtClean="0"/>
-                        <a:t>20</a:t>
+                        <a:t>45</a:t>
                       </a:r>
                       <a:endParaRPr lang="en-US" dirty="0"/>
                     </a:p>
                   </a:txBody>
-                  <a:tcPr/>
+                  <a:tcPr>
+                    <a:lnL w="38100" cap="flat" cmpd="sng" algn="ctr">
+                      <a:solidFill>
+                        <a:schemeClr val="bg1"/>
+                      </a:solidFill>
+                      <a:prstDash val="solid"/>
+                      <a:round/>
+                      <a:headEnd type="none" w="med" len="med"/>
+                      <a:tailEnd type="none" w="med" len="med"/>
+                    </a:lnL>
+                    <a:lnB w="12700" cap="flat" cmpd="sng" algn="ctr">
+                      <a:solidFill>
+                        <a:schemeClr val="tx1"/>
+                      </a:solidFill>
+                      <a:prstDash val="solid"/>
+                      <a:round/>
+                      <a:headEnd type="none" w="med" len="med"/>
+                      <a:tailEnd type="none" w="med" len="med"/>
+                    </a:lnB>
+                  </a:tcPr>
                 </a:tc>
                 <a:tc>
                   <a:txBody>
@@ -5234,7 +3933,17 @@
                       <a:endParaRPr lang="en-US" dirty="0"/>
                     </a:p>
                   </a:txBody>
-                  <a:tcPr/>
+                  <a:tcPr>
+                    <a:lnB w="12700" cap="flat" cmpd="sng" algn="ctr">
+                      <a:solidFill>
+                        <a:schemeClr val="tx1"/>
+                      </a:solidFill>
+                      <a:prstDash val="solid"/>
+                      <a:round/>
+                      <a:headEnd type="none" w="med" len="med"/>
+                      <a:tailEnd type="none" w="med" len="med"/>
+                    </a:lnB>
+                  </a:tcPr>
                 </a:tc>
                 <a:extLst>
                   <a:ext uri="{0D108BD9-81ED-4DB2-BD59-A6C34878D82A}">
@@ -5280,7 +3989,25 @@
                         <a:rPr lang="en-GB" sz="1800" dirty="0" smtClean="0">
                           <a:effectLst/>
                         </a:rPr>
-                        <a:t>% of NA points due to dispersal limitation randomly turned into absences)</a:t>
+                        <a:t>NA </a:t>
+                      </a:r>
+                      <a:r>
+                        <a:rPr lang="en-GB" sz="1800" dirty="0" smtClean="0">
+                          <a:effectLst/>
+                        </a:rPr>
+                        <a:t>points due to dispersal limitation </a:t>
+                      </a:r>
+                      <a:r>
+                        <a:rPr lang="en-GB" sz="1800" dirty="0" smtClean="0">
+                          <a:effectLst/>
+                        </a:rPr>
+                        <a:t>turned </a:t>
+                      </a:r>
+                      <a:r>
+                        <a:rPr lang="en-GB" sz="1800" dirty="0" smtClean="0">
+                          <a:effectLst/>
+                        </a:rPr>
+                        <a:t>into absences)</a:t>
                       </a:r>
                       <a:endParaRPr lang="en-US" sz="2800" dirty="0" smtClean="0">
                         <a:solidFill>
@@ -5293,7 +4020,17 @@
                       </a:endParaRPr>
                     </a:p>
                   </a:txBody>
-                  <a:tcPr/>
+                  <a:tcPr>
+                    <a:lnT w="12700" cap="flat" cmpd="sng" algn="ctr">
+                      <a:solidFill>
+                        <a:schemeClr val="tx1"/>
+                      </a:solidFill>
+                      <a:prstDash val="solid"/>
+                      <a:round/>
+                      <a:headEnd type="none" w="med" len="med"/>
+                      <a:tailEnd type="none" w="med" len="med"/>
+                    </a:lnT>
+                  </a:tcPr>
                 </a:tc>
                 <a:tc>
                   <a:txBody>
@@ -5302,54 +4039,196 @@
                     <a:p>
                       <a:r>
                         <a:rPr lang="en-US" dirty="0" smtClean="0"/>
-                        <a:t>0</a:t>
+                        <a:t>yes/no</a:t>
                       </a:r>
                       <a:endParaRPr lang="en-US" dirty="0"/>
                     </a:p>
                   </a:txBody>
-                  <a:tcPr/>
+                  <a:tcPr>
+                    <a:lnT w="12700" cap="flat" cmpd="sng" algn="ctr">
+                      <a:solidFill>
+                        <a:schemeClr val="tx1"/>
+                      </a:solidFill>
+                      <a:prstDash val="solid"/>
+                      <a:round/>
+                      <a:headEnd type="none" w="med" len="med"/>
+                      <a:tailEnd type="none" w="med" len="med"/>
+                    </a:lnT>
+                  </a:tcPr>
                 </a:tc>
                 <a:tc>
                   <a:txBody>
                     <a:bodyPr/>
                     <a:lstStyle/>
                     <a:p>
+                      <a:pPr marL="0" marR="0" lvl="0" indent="0" algn="l" defTabSz="914400" rtl="0" eaLnBrk="1" fontAlgn="auto" latinLnBrk="0" hangingPunct="1">
+                        <a:lnSpc>
+                          <a:spcPct val="100000"/>
+                        </a:lnSpc>
+                        <a:spcBef>
+                          <a:spcPts val="0"/>
+                        </a:spcBef>
+                        <a:spcAft>
+                          <a:spcPts val="0"/>
+                        </a:spcAft>
+                        <a:buClrTx/>
+                        <a:buSzTx/>
+                        <a:buFontTx/>
+                        <a:buNone/>
+                        <a:tabLst/>
+                        <a:defRPr/>
+                      </a:pPr>
                       <a:r>
                         <a:rPr lang="en-US" dirty="0" smtClean="0"/>
-                        <a:t>25</a:t>
-                      </a:r>
+                        <a:t>yes/no</a:t>
+                      </a:r>
+                    </a:p>
+                    <a:p>
                       <a:endParaRPr lang="en-US" dirty="0"/>
                     </a:p>
                   </a:txBody>
-                  <a:tcPr/>
+                  <a:tcPr>
+                    <a:lnR w="12700" cap="flat" cmpd="sng" algn="ctr">
+                      <a:solidFill>
+                        <a:schemeClr val="bg1"/>
+                      </a:solidFill>
+                      <a:prstDash val="solid"/>
+                      <a:round/>
+                      <a:headEnd type="none" w="med" len="med"/>
+                      <a:tailEnd type="none" w="med" len="med"/>
+                    </a:lnR>
+                    <a:lnT w="12700" cap="flat" cmpd="sng" algn="ctr">
+                      <a:solidFill>
+                        <a:schemeClr val="tx1"/>
+                      </a:solidFill>
+                      <a:prstDash val="solid"/>
+                      <a:round/>
+                      <a:headEnd type="none" w="med" len="med"/>
+                      <a:tailEnd type="none" w="med" len="med"/>
+                    </a:lnT>
+                  </a:tcPr>
                 </a:tc>
                 <a:tc>
                   <a:txBody>
                     <a:bodyPr/>
                     <a:lstStyle/>
                     <a:p>
-                      <a:r>
-                        <a:rPr lang="en-US" dirty="0" smtClean="0"/>
-                        <a:t>50</a:t>
-                      </a:r>
+                      <a:pPr marL="0" marR="0" lvl="0" indent="0" algn="l" defTabSz="914400" rtl="0" eaLnBrk="1" fontAlgn="auto" latinLnBrk="0" hangingPunct="1">
+                        <a:lnSpc>
+                          <a:spcPct val="100000"/>
+                        </a:lnSpc>
+                        <a:spcBef>
+                          <a:spcPts val="0"/>
+                        </a:spcBef>
+                        <a:spcAft>
+                          <a:spcPts val="0"/>
+                        </a:spcAft>
+                        <a:buClrTx/>
+                        <a:buSzTx/>
+                        <a:buFontTx/>
+                        <a:buNone/>
+                        <a:tabLst/>
+                        <a:defRPr/>
+                      </a:pPr>
+                      <a:r>
+                        <a:rPr lang="en-US" b="1" dirty="0" smtClean="0"/>
+                        <a:t>yes/no</a:t>
+                      </a:r>
+                    </a:p>
+                    <a:p>
                       <a:endParaRPr lang="en-US" dirty="0"/>
                     </a:p>
                   </a:txBody>
-                  <a:tcPr/>
+                  <a:tcPr>
+                    <a:lnL w="12700" cap="flat" cmpd="sng" algn="ctr">
+                      <a:solidFill>
+                        <a:schemeClr val="bg1"/>
+                      </a:solidFill>
+                      <a:prstDash val="solid"/>
+                      <a:round/>
+                      <a:headEnd type="none" w="med" len="med"/>
+                      <a:tailEnd type="none" w="med" len="med"/>
+                    </a:lnL>
+                    <a:lnR w="12700" cap="flat" cmpd="sng" algn="ctr">
+                      <a:solidFill>
+                        <a:schemeClr val="bg1"/>
+                      </a:solidFill>
+                      <a:prstDash val="solid"/>
+                      <a:round/>
+                      <a:headEnd type="none" w="med" len="med"/>
+                      <a:tailEnd type="none" w="med" len="med"/>
+                    </a:lnR>
+                    <a:lnT w="12700" cap="flat" cmpd="sng" algn="ctr">
+                      <a:solidFill>
+                        <a:schemeClr val="tx1"/>
+                      </a:solidFill>
+                      <a:prstDash val="solid"/>
+                      <a:round/>
+                      <a:headEnd type="none" w="med" len="med"/>
+                      <a:tailEnd type="none" w="med" len="med"/>
+                    </a:lnT>
+                    <a:lnB w="12700" cap="flat" cmpd="sng" algn="ctr">
+                      <a:solidFill>
+                        <a:schemeClr val="bg1"/>
+                      </a:solidFill>
+                      <a:prstDash val="solid"/>
+                      <a:round/>
+                      <a:headEnd type="none" w="med" len="med"/>
+                      <a:tailEnd type="none" w="med" len="med"/>
+                    </a:lnB>
+                  </a:tcPr>
                 </a:tc>
                 <a:tc>
                   <a:txBody>
                     <a:bodyPr/>
                     <a:lstStyle/>
                     <a:p>
+                      <a:pPr marL="0" marR="0" lvl="0" indent="0" algn="l" defTabSz="914400" rtl="0" eaLnBrk="1" fontAlgn="auto" latinLnBrk="0" hangingPunct="1">
+                        <a:lnSpc>
+                          <a:spcPct val="100000"/>
+                        </a:lnSpc>
+                        <a:spcBef>
+                          <a:spcPts val="0"/>
+                        </a:spcBef>
+                        <a:spcAft>
+                          <a:spcPts val="0"/>
+                        </a:spcAft>
+                        <a:buClrTx/>
+                        <a:buSzTx/>
+                        <a:buFontTx/>
+                        <a:buNone/>
+                        <a:tabLst/>
+                        <a:defRPr/>
+                      </a:pPr>
                       <a:r>
                         <a:rPr lang="en-US" dirty="0" smtClean="0"/>
-                        <a:t>100</a:t>
-                      </a:r>
+                        <a:t>yes/no</a:t>
+                      </a:r>
+                    </a:p>
+                    <a:p>
                       <a:endParaRPr lang="en-US" dirty="0"/>
                     </a:p>
                   </a:txBody>
-                  <a:tcPr/>
+                  <a:tcPr>
+                    <a:lnL w="12700" cap="flat" cmpd="sng" algn="ctr">
+                      <a:solidFill>
+                        <a:schemeClr val="bg1"/>
+                      </a:solidFill>
+                      <a:prstDash val="solid"/>
+                      <a:round/>
+                      <a:headEnd type="none" w="med" len="med"/>
+                      <a:tailEnd type="none" w="med" len="med"/>
+                    </a:lnL>
+                    <a:lnT w="12700" cap="flat" cmpd="sng" algn="ctr">
+                      <a:solidFill>
+                        <a:schemeClr val="tx1"/>
+                      </a:solidFill>
+                      <a:prstDash val="solid"/>
+                      <a:round/>
+                      <a:headEnd type="none" w="med" len="med"/>
+                      <a:tailEnd type="none" w="med" len="med"/>
+                    </a:lnT>
+                  </a:tcPr>
                 </a:tc>
                 <a:tc>
                   <a:txBody>
@@ -5359,7 +4238,17 @@
                       <a:endParaRPr lang="en-US" dirty="0"/>
                     </a:p>
                   </a:txBody>
-                  <a:tcPr/>
+                  <a:tcPr>
+                    <a:lnT w="12700" cap="flat" cmpd="sng" algn="ctr">
+                      <a:solidFill>
+                        <a:schemeClr val="tx1"/>
+                      </a:solidFill>
+                      <a:prstDash val="solid"/>
+                      <a:round/>
+                      <a:headEnd type="none" w="med" len="med"/>
+                      <a:tailEnd type="none" w="med" len="med"/>
+                    </a:lnT>
+                  </a:tcPr>
                 </a:tc>
                 <a:extLst>
                   <a:ext uri="{0D108BD9-81ED-4DB2-BD59-A6C34878D82A}">
@@ -5384,7 +4273,7 @@
 </p:sld>
 </file>
 
-<file path=ppt/slides/slide4.xml><?xml version="1.0" encoding="utf-8"?>
+<file path=ppt/slides/slide3.xml><?xml version="1.0" encoding="utf-8"?>
 <p:sld xmlns:a="http://schemas.openxmlformats.org/drawingml/2006/main" xmlns:r="http://schemas.openxmlformats.org/officeDocument/2006/relationships" xmlns:p="http://schemas.openxmlformats.org/presentationml/2006/main">
   <p:cSld>
     <p:spTree>
@@ -5450,12 +4339,16 @@
               <a:t>If </a:t>
             </a:r>
             <a:r>
-              <a:rPr lang="en-US" dirty="0" err="1" smtClean="0"/>
-              <a:t>noise.disp</a:t>
+              <a:rPr lang="en-US" dirty="0" err="1"/>
+              <a:t>na.to.absence</a:t>
+            </a:r>
+            <a:r>
+              <a:rPr lang="en-US" dirty="0"/>
+              <a:t> </a:t>
             </a:r>
             <a:r>
               <a:rPr lang="en-US" dirty="0" smtClean="0"/>
-              <a:t> = T, we test add noise due to dispersal limitation, in other words we transform </a:t>
+              <a:t>= T, we test add noise due to dispersal limitation, in other words we transform </a:t>
             </a:r>
             <a:r>
               <a:rPr lang="en-US" dirty="0" err="1" smtClean="0"/>
@@ -5472,20 +4365,16 @@
               <a:t>If </a:t>
             </a:r>
             <a:r>
-              <a:rPr lang="en-US" dirty="0" err="1" smtClean="0"/>
-              <a:t>noise.disp</a:t>
+              <a:rPr lang="en-US" dirty="0" err="1"/>
+              <a:t>na.to.absence</a:t>
+            </a:r>
+            <a:r>
+              <a:rPr lang="en-US" dirty="0"/>
+              <a:t> </a:t>
             </a:r>
             <a:r>
               <a:rPr lang="en-US" dirty="0" smtClean="0"/>
-              <a:t> = F, we have no “false” information coming from dispersal limitation, so we </a:t>
-            </a:r>
-            <a:r>
-              <a:rPr lang="en-US" smtClean="0"/>
-              <a:t>remove NAs </a:t>
-            </a:r>
-            <a:r>
-              <a:rPr lang="en-US" dirty="0" smtClean="0"/>
-              <a:t>per taxa</a:t>
+              <a:t>= F, we have no “false” information coming from dispersal limitation, so we remove NAs per taxa</a:t>
             </a:r>
             <a:endParaRPr lang="en-US" dirty="0"/>
           </a:p>

</xml_diff>

<commit_message>
update plot for comparing all scenarios
</commit_message>
<xml_diff>
--- a/C1_documentation/analysis_noise_scenarios.pptx
+++ b/C1_documentation/analysis_noise_scenarios.pptx
@@ -8,6 +8,7 @@
     <p:sldId id="256" r:id="rId2"/>
     <p:sldId id="260" r:id="rId3"/>
     <p:sldId id="258" r:id="rId4"/>
+    <p:sldId id="261" r:id="rId5"/>
   </p:sldIdLst>
   <p:sldSz cx="12192000" cy="6858000"/>
   <p:notesSz cx="6858000" cy="9144000"/>
@@ -245,7 +246,7 @@
           <a:p>
             <a:fld id="{FCCADD97-FA4F-4F85-9ADA-B95C63D71438}" type="datetimeFigureOut">
               <a:rPr lang="de-CH" smtClean="0"/>
-              <a:t>13.05.2025</a:t>
+              <a:t>01.07.2025</a:t>
             </a:fld>
             <a:endParaRPr lang="de-CH"/>
           </a:p>
@@ -415,7 +416,7 @@
           <a:p>
             <a:fld id="{FCCADD97-FA4F-4F85-9ADA-B95C63D71438}" type="datetimeFigureOut">
               <a:rPr lang="de-CH" smtClean="0"/>
-              <a:t>13.05.2025</a:t>
+              <a:t>01.07.2025</a:t>
             </a:fld>
             <a:endParaRPr lang="de-CH"/>
           </a:p>
@@ -595,7 +596,7 @@
           <a:p>
             <a:fld id="{FCCADD97-FA4F-4F85-9ADA-B95C63D71438}" type="datetimeFigureOut">
               <a:rPr lang="de-CH" smtClean="0"/>
-              <a:t>13.05.2025</a:t>
+              <a:t>01.07.2025</a:t>
             </a:fld>
             <a:endParaRPr lang="de-CH"/>
           </a:p>
@@ -765,7 +766,7 @@
           <a:p>
             <a:fld id="{FCCADD97-FA4F-4F85-9ADA-B95C63D71438}" type="datetimeFigureOut">
               <a:rPr lang="de-CH" smtClean="0"/>
-              <a:t>13.05.2025</a:t>
+              <a:t>01.07.2025</a:t>
             </a:fld>
             <a:endParaRPr lang="de-CH"/>
           </a:p>
@@ -1011,7 +1012,7 @@
           <a:p>
             <a:fld id="{FCCADD97-FA4F-4F85-9ADA-B95C63D71438}" type="datetimeFigureOut">
               <a:rPr lang="de-CH" smtClean="0"/>
-              <a:t>13.05.2025</a:t>
+              <a:t>01.07.2025</a:t>
             </a:fld>
             <a:endParaRPr lang="de-CH"/>
           </a:p>
@@ -1243,7 +1244,7 @@
           <a:p>
             <a:fld id="{FCCADD97-FA4F-4F85-9ADA-B95C63D71438}" type="datetimeFigureOut">
               <a:rPr lang="de-CH" smtClean="0"/>
-              <a:t>13.05.2025</a:t>
+              <a:t>01.07.2025</a:t>
             </a:fld>
             <a:endParaRPr lang="de-CH"/>
           </a:p>
@@ -1610,7 +1611,7 @@
           <a:p>
             <a:fld id="{FCCADD97-FA4F-4F85-9ADA-B95C63D71438}" type="datetimeFigureOut">
               <a:rPr lang="de-CH" smtClean="0"/>
-              <a:t>13.05.2025</a:t>
+              <a:t>01.07.2025</a:t>
             </a:fld>
             <a:endParaRPr lang="de-CH"/>
           </a:p>
@@ -1728,7 +1729,7 @@
           <a:p>
             <a:fld id="{FCCADD97-FA4F-4F85-9ADA-B95C63D71438}" type="datetimeFigureOut">
               <a:rPr lang="de-CH" smtClean="0"/>
-              <a:t>13.05.2025</a:t>
+              <a:t>01.07.2025</a:t>
             </a:fld>
             <a:endParaRPr lang="de-CH"/>
           </a:p>
@@ -1823,7 +1824,7 @@
           <a:p>
             <a:fld id="{FCCADD97-FA4F-4F85-9ADA-B95C63D71438}" type="datetimeFigureOut">
               <a:rPr lang="de-CH" smtClean="0"/>
-              <a:t>13.05.2025</a:t>
+              <a:t>01.07.2025</a:t>
             </a:fld>
             <a:endParaRPr lang="de-CH"/>
           </a:p>
@@ -2100,7 +2101,7 @@
           <a:p>
             <a:fld id="{FCCADD97-FA4F-4F85-9ADA-B95C63D71438}" type="datetimeFigureOut">
               <a:rPr lang="de-CH" smtClean="0"/>
-              <a:t>13.05.2025</a:t>
+              <a:t>01.07.2025</a:t>
             </a:fld>
             <a:endParaRPr lang="de-CH"/>
           </a:p>
@@ -2353,7 +2354,7 @@
           <a:p>
             <a:fld id="{FCCADD97-FA4F-4F85-9ADA-B95C63D71438}" type="datetimeFigureOut">
               <a:rPr lang="de-CH" smtClean="0"/>
-              <a:t>13.05.2025</a:t>
+              <a:t>01.07.2025</a:t>
             </a:fld>
             <a:endParaRPr lang="de-CH"/>
           </a:p>
@@ -2566,7 +2567,7 @@
           <a:p>
             <a:fld id="{FCCADD97-FA4F-4F85-9ADA-B95C63D71438}" type="datetimeFigureOut">
               <a:rPr lang="de-CH" smtClean="0"/>
-              <a:t>13.05.2025</a:t>
+              <a:t>01.07.2025</a:t>
             </a:fld>
             <a:endParaRPr lang="de-CH"/>
           </a:p>
@@ -3060,11 +3061,7 @@
           <a:p>
             <a:r>
               <a:rPr lang="en-US" dirty="0" smtClean="0"/>
-              <a:t>Continuous degradation of </a:t>
-            </a:r>
-            <a:r>
-              <a:rPr lang="en-US" dirty="0" smtClean="0"/>
-              <a:t>data</a:t>
+              <a:t>Continuous degradation of data</a:t>
             </a:r>
             <a:endParaRPr lang="en-US" dirty="0"/>
           </a:p>
@@ -3416,11 +3413,7 @@
                       </a:r>
                       <a:r>
                         <a:rPr lang="en-US" dirty="0" smtClean="0"/>
-                        <a:t> </a:t>
-                      </a:r>
-                      <a:r>
-                        <a:rPr lang="en-US" dirty="0" smtClean="0"/>
-                        <a:t>of</a:t>
+                        <a:t> of</a:t>
                       </a:r>
                       <a:r>
                         <a:rPr lang="en-US" baseline="0" dirty="0" smtClean="0"/>
@@ -3428,11 +3421,7 @@
                       </a:r>
                       <a:r>
                         <a:rPr lang="en-US" dirty="0" smtClean="0"/>
-                        <a:t> </a:t>
-                      </a:r>
-                      <a:r>
-                        <a:rPr lang="en-US" dirty="0" smtClean="0"/>
-                        <a:t>predictors</a:t>
+                        <a:t> predictors</a:t>
                       </a:r>
                     </a:p>
                   </a:txBody>
@@ -3989,25 +3978,7 @@
                         <a:rPr lang="en-GB" sz="1800" dirty="0" smtClean="0">
                           <a:effectLst/>
                         </a:rPr>
-                        <a:t>NA </a:t>
-                      </a:r>
-                      <a:r>
-                        <a:rPr lang="en-GB" sz="1800" dirty="0" smtClean="0">
-                          <a:effectLst/>
-                        </a:rPr>
-                        <a:t>points due to dispersal limitation </a:t>
-                      </a:r>
-                      <a:r>
-                        <a:rPr lang="en-GB" sz="1800" dirty="0" smtClean="0">
-                          <a:effectLst/>
-                        </a:rPr>
-                        <a:t>turned </a:t>
-                      </a:r>
-                      <a:r>
-                        <a:rPr lang="en-GB" sz="1800" dirty="0" smtClean="0">
-                          <a:effectLst/>
-                        </a:rPr>
-                        <a:t>into absences)</a:t>
+                        <a:t>NA points due to dispersal limitation turned into absences)</a:t>
                       </a:r>
                       <a:endParaRPr lang="en-US" sz="2800" dirty="0" smtClean="0">
                         <a:solidFill>
@@ -4393,6 +4364,1813 @@
 </p:sld>
 </file>
 
+<file path=ppt/slides/slide4.xml><?xml version="1.0" encoding="utf-8"?>
+<p:sld xmlns:a="http://schemas.openxmlformats.org/drawingml/2006/main" xmlns:r="http://schemas.openxmlformats.org/officeDocument/2006/relationships" xmlns:p="http://schemas.openxmlformats.org/presentationml/2006/main">
+  <p:cSld>
+    <p:spTree>
+      <p:nvGrpSpPr>
+        <p:cNvPr id="1" name=""/>
+        <p:cNvGrpSpPr/>
+        <p:nvPr/>
+      </p:nvGrpSpPr>
+      <p:grpSpPr>
+        <a:xfrm>
+          <a:off x="0" y="0"/>
+          <a:ext cx="0" cy="0"/>
+          <a:chOff x="0" y="0"/>
+          <a:chExt cx="0" cy="0"/>
+        </a:xfrm>
+      </p:grpSpPr>
+      <p:sp>
+        <p:nvSpPr>
+          <p:cNvPr id="2" name="Title 1"/>
+          <p:cNvSpPr>
+            <a:spLocks noGrp="1"/>
+          </p:cNvSpPr>
+          <p:nvPr>
+            <p:ph type="title"/>
+          </p:nvPr>
+        </p:nvSpPr>
+        <p:spPr>
+          <a:xfrm>
+            <a:off x="838200" y="168156"/>
+            <a:ext cx="10515600" cy="1325563"/>
+          </a:xfrm>
+        </p:spPr>
+        <p:txBody>
+          <a:bodyPr>
+            <a:normAutofit/>
+          </a:bodyPr>
+          <a:lstStyle/>
+          <a:p>
+            <a:pPr algn="ctr"/>
+            <a:r>
+              <a:rPr lang="en-US" dirty="0" smtClean="0">
+                <a:latin typeface="Galvji" panose="020B0504020202020204" pitchFamily="34" charset="77"/>
+              </a:rPr>
+              <a:t>Workflow</a:t>
+            </a:r>
+            <a:br>
+              <a:rPr lang="en-US" dirty="0" smtClean="0">
+                <a:latin typeface="Galvji" panose="020B0504020202020204" pitchFamily="34" charset="77"/>
+              </a:rPr>
+            </a:br>
+            <a:endParaRPr lang="en-US" dirty="0">
+              <a:latin typeface="Galvji" panose="020B0504020202020204" pitchFamily="34" charset="77"/>
+            </a:endParaRPr>
+          </a:p>
+        </p:txBody>
+      </p:sp>
+      <p:sp>
+        <p:nvSpPr>
+          <p:cNvPr id="17" name="Footer Placeholder 16"/>
+          <p:cNvSpPr>
+            <a:spLocks noGrp="1"/>
+          </p:cNvSpPr>
+          <p:nvPr>
+            <p:ph type="ftr" sz="quarter" idx="11"/>
+          </p:nvPr>
+        </p:nvSpPr>
+        <p:spPr/>
+        <p:txBody>
+          <a:bodyPr/>
+          <a:lstStyle/>
+          <a:p>
+            <a:r>
+              <a:rPr lang="en-US" smtClean="0"/>
+              <a:t>DEUS </a:t>
+            </a:r>
+            <a:endParaRPr lang="en-US"/>
+          </a:p>
+        </p:txBody>
+      </p:sp>
+      <p:sp>
+        <p:nvSpPr>
+          <p:cNvPr id="5" name="Slide Number Placeholder 4"/>
+          <p:cNvSpPr>
+            <a:spLocks noGrp="1"/>
+          </p:cNvSpPr>
+          <p:nvPr>
+            <p:ph type="sldNum" sz="quarter" idx="12"/>
+          </p:nvPr>
+        </p:nvSpPr>
+        <p:spPr/>
+        <p:txBody>
+          <a:bodyPr/>
+          <a:lstStyle/>
+          <a:p>
+            <a:fld id="{148ECF3A-10B0-45FD-B817-2BE51D49F984}" type="slidenum">
+              <a:rPr lang="en-US" smtClean="0"/>
+              <a:t>4</a:t>
+            </a:fld>
+            <a:endParaRPr lang="en-US"/>
+          </a:p>
+        </p:txBody>
+      </p:sp>
+      <p:sp>
+        <p:nvSpPr>
+          <p:cNvPr id="8" name="TextBox 7"/>
+          <p:cNvSpPr txBox="1"/>
+          <p:nvPr/>
+        </p:nvSpPr>
+        <p:spPr>
+          <a:xfrm>
+            <a:off x="2737455" y="900940"/>
+            <a:ext cx="1876722" cy="341278"/>
+          </a:xfrm>
+          <a:prstGeom prst="rect">
+            <a:avLst/>
+          </a:prstGeom>
+          <a:noFill/>
+          <a:ln>
+            <a:noFill/>
+          </a:ln>
+        </p:spPr>
+        <p:style>
+          <a:lnRef idx="2">
+            <a:schemeClr val="accent1">
+              <a:shade val="50000"/>
+            </a:schemeClr>
+          </a:lnRef>
+          <a:fillRef idx="1">
+            <a:schemeClr val="accent1"/>
+          </a:fillRef>
+          <a:effectRef idx="0">
+            <a:schemeClr val="accent1"/>
+          </a:effectRef>
+          <a:fontRef idx="minor">
+            <a:schemeClr val="lt1"/>
+          </a:fontRef>
+        </p:style>
+        <p:txBody>
+          <a:bodyPr rtlCol="0" anchor="ctr"/>
+          <a:lstStyle>
+            <a:defPPr>
+              <a:defRPr lang="en-US"/>
+            </a:defPPr>
+            <a:lvl1pPr algn="ctr">
+              <a:defRPr sz="2000">
+                <a:solidFill>
+                  <a:schemeClr val="bg1"/>
+                </a:solidFill>
+                <a:latin typeface="Galvji" panose="020B0504020202020204" pitchFamily="34" charset="0"/>
+                <a:cs typeface="Arial" panose="020B0604020202020204" pitchFamily="34" charset="0"/>
+              </a:defRPr>
+            </a:lvl1pPr>
+            <a:lvl2pPr>
+              <a:defRPr>
+                <a:solidFill>
+                  <a:schemeClr val="lt1"/>
+                </a:solidFill>
+              </a:defRPr>
+            </a:lvl2pPr>
+            <a:lvl3pPr>
+              <a:defRPr>
+                <a:solidFill>
+                  <a:schemeClr val="lt1"/>
+                </a:solidFill>
+              </a:defRPr>
+            </a:lvl3pPr>
+            <a:lvl4pPr>
+              <a:defRPr>
+                <a:solidFill>
+                  <a:schemeClr val="lt1"/>
+                </a:solidFill>
+              </a:defRPr>
+            </a:lvl4pPr>
+            <a:lvl5pPr>
+              <a:defRPr>
+                <a:solidFill>
+                  <a:schemeClr val="lt1"/>
+                </a:solidFill>
+              </a:defRPr>
+            </a:lvl5pPr>
+            <a:lvl6pPr>
+              <a:defRPr>
+                <a:solidFill>
+                  <a:schemeClr val="lt1"/>
+                </a:solidFill>
+              </a:defRPr>
+            </a:lvl6pPr>
+            <a:lvl7pPr>
+              <a:defRPr>
+                <a:solidFill>
+                  <a:schemeClr val="lt1"/>
+                </a:solidFill>
+              </a:defRPr>
+            </a:lvl7pPr>
+            <a:lvl8pPr>
+              <a:defRPr>
+                <a:solidFill>
+                  <a:schemeClr val="lt1"/>
+                </a:solidFill>
+              </a:defRPr>
+            </a:lvl8pPr>
+            <a:lvl9pPr>
+              <a:defRPr>
+                <a:solidFill>
+                  <a:schemeClr val="lt1"/>
+                </a:solidFill>
+              </a:defRPr>
+            </a:lvl9pPr>
+          </a:lstStyle>
+          <a:p>
+            <a:r>
+              <a:rPr lang="en-US" b="1" dirty="0" smtClean="0">
+                <a:solidFill>
+                  <a:schemeClr val="tx1"/>
+                </a:solidFill>
+              </a:rPr>
+              <a:t>Input Data</a:t>
+            </a:r>
+            <a:endParaRPr lang="en-US" b="1" dirty="0">
+              <a:solidFill>
+                <a:schemeClr val="tx1"/>
+              </a:solidFill>
+            </a:endParaRPr>
+          </a:p>
+        </p:txBody>
+      </p:sp>
+      <p:sp>
+        <p:nvSpPr>
+          <p:cNvPr id="11" name="TextBox 10"/>
+          <p:cNvSpPr txBox="1"/>
+          <p:nvPr/>
+        </p:nvSpPr>
+        <p:spPr>
+          <a:xfrm>
+            <a:off x="6018394" y="840200"/>
+            <a:ext cx="1391919" cy="461664"/>
+          </a:xfrm>
+          <a:prstGeom prst="rect">
+            <a:avLst/>
+          </a:prstGeom>
+          <a:noFill/>
+          <a:ln>
+            <a:noFill/>
+          </a:ln>
+        </p:spPr>
+        <p:style>
+          <a:lnRef idx="2">
+            <a:schemeClr val="accent1">
+              <a:shade val="50000"/>
+            </a:schemeClr>
+          </a:lnRef>
+          <a:fillRef idx="1">
+            <a:schemeClr val="accent1"/>
+          </a:fillRef>
+          <a:effectRef idx="0">
+            <a:schemeClr val="accent1"/>
+          </a:effectRef>
+          <a:fontRef idx="minor">
+            <a:schemeClr val="lt1"/>
+          </a:fontRef>
+        </p:style>
+        <p:txBody>
+          <a:bodyPr rtlCol="0" anchor="ctr"/>
+          <a:lstStyle>
+            <a:defPPr>
+              <a:defRPr lang="en-US"/>
+            </a:defPPr>
+            <a:lvl1pPr algn="ctr">
+              <a:defRPr sz="2000" b="1">
+                <a:solidFill>
+                  <a:schemeClr val="tx1"/>
+                </a:solidFill>
+                <a:latin typeface="Galvji" panose="020B0504020202020204" pitchFamily="34" charset="0"/>
+                <a:cs typeface="Arial" panose="020B0604020202020204" pitchFamily="34" charset="0"/>
+              </a:defRPr>
+            </a:lvl1pPr>
+          </a:lstStyle>
+          <a:p>
+            <a:r>
+              <a:rPr lang="en-US" dirty="0" smtClean="0"/>
+              <a:t>Models</a:t>
+            </a:r>
+            <a:endParaRPr lang="en-US" dirty="0"/>
+          </a:p>
+        </p:txBody>
+      </p:sp>
+      <p:sp>
+        <p:nvSpPr>
+          <p:cNvPr id="14" name="TextBox 13"/>
+          <p:cNvSpPr txBox="1"/>
+          <p:nvPr/>
+        </p:nvSpPr>
+        <p:spPr>
+          <a:xfrm>
+            <a:off x="8744004" y="842413"/>
+            <a:ext cx="1782363" cy="400110"/>
+          </a:xfrm>
+          <a:prstGeom prst="rect">
+            <a:avLst/>
+          </a:prstGeom>
+          <a:noFill/>
+        </p:spPr>
+        <p:txBody>
+          <a:bodyPr wrap="square" rtlCol="0">
+            <a:spAutoFit/>
+          </a:bodyPr>
+          <a:lstStyle/>
+          <a:p>
+            <a:r>
+              <a:rPr lang="en-US" sz="2000" b="1" dirty="0" smtClean="0">
+                <a:latin typeface="Galvji" panose="020B0504020202020204" pitchFamily="34" charset="0"/>
+                <a:cs typeface="Arial" panose="020B0604020202020204" pitchFamily="34" charset="0"/>
+              </a:rPr>
+              <a:t>Output Data</a:t>
+            </a:r>
+            <a:endParaRPr lang="en-US" sz="2400" b="1" dirty="0">
+              <a:latin typeface="Galvji" panose="020B0504020202020204" pitchFamily="34" charset="0"/>
+              <a:cs typeface="Arial" panose="020B0604020202020204" pitchFamily="34" charset="0"/>
+            </a:endParaRPr>
+          </a:p>
+        </p:txBody>
+      </p:sp>
+      <p:grpSp>
+        <p:nvGrpSpPr>
+          <p:cNvPr id="42" name="Group 41"/>
+          <p:cNvGrpSpPr/>
+          <p:nvPr/>
+        </p:nvGrpSpPr>
+        <p:grpSpPr>
+          <a:xfrm>
+            <a:off x="2494066" y="1453691"/>
+            <a:ext cx="8583356" cy="1483145"/>
+            <a:chOff x="2671866" y="1645546"/>
+            <a:chExt cx="8583356" cy="1483145"/>
+          </a:xfrm>
+        </p:grpSpPr>
+        <p:sp>
+          <p:nvSpPr>
+            <p:cNvPr id="10" name="Pentagon 9"/>
+            <p:cNvSpPr/>
+            <p:nvPr/>
+          </p:nvSpPr>
+          <p:spPr>
+            <a:xfrm>
+              <a:off x="5653025" y="1665651"/>
+              <a:ext cx="2651760" cy="1463040"/>
+            </a:xfrm>
+            <a:prstGeom prst="homePlate">
+              <a:avLst>
+                <a:gd name="adj" fmla="val 17105"/>
+              </a:avLst>
+            </a:prstGeom>
+            <a:solidFill>
+              <a:schemeClr val="bg2">
+                <a:lumMod val="75000"/>
+              </a:schemeClr>
+            </a:solidFill>
+            <a:ln>
+              <a:noFill/>
+            </a:ln>
+          </p:spPr>
+          <p:style>
+            <a:lnRef idx="2">
+              <a:schemeClr val="accent1">
+                <a:shade val="50000"/>
+              </a:schemeClr>
+            </a:lnRef>
+            <a:fillRef idx="1">
+              <a:schemeClr val="accent1"/>
+            </a:fillRef>
+            <a:effectRef idx="0">
+              <a:schemeClr val="accent1"/>
+            </a:effectRef>
+            <a:fontRef idx="minor">
+              <a:schemeClr val="lt1"/>
+            </a:fontRef>
+          </p:style>
+          <p:txBody>
+            <a:bodyPr rtlCol="0" anchor="ctr"/>
+            <a:lstStyle/>
+            <a:p>
+              <a:pPr algn="ctr">
+                <a:spcAft>
+                  <a:spcPts val="1200"/>
+                </a:spcAft>
+              </a:pPr>
+              <a:r>
+                <a:rPr lang="en-US" sz="1600" b="1" dirty="0" smtClean="0">
+                  <a:solidFill>
+                    <a:schemeClr val="bg1"/>
+                  </a:solidFill>
+                  <a:latin typeface="Galvji" panose="020B0504020202020204" pitchFamily="34" charset="0"/>
+                  <a:cs typeface="Arial" panose="020B0604020202020204" pitchFamily="34" charset="0"/>
+                </a:rPr>
+                <a:t>Streambugs</a:t>
+              </a:r>
+            </a:p>
+            <a:p>
+              <a:pPr marL="285750" indent="-173038">
+                <a:buFont typeface="Arial" panose="020B0604020202020204" pitchFamily="34" charset="0"/>
+                <a:buChar char="•"/>
+                <a:tabLst>
+                  <a:tab pos="1250950" algn="l"/>
+                </a:tabLst>
+              </a:pPr>
+              <a:r>
+                <a:rPr lang="en-US" sz="1400" dirty="0">
+                  <a:solidFill>
+                    <a:schemeClr val="bg1"/>
+                  </a:solidFill>
+                  <a:latin typeface="Galvji" panose="020B0504020202020204" pitchFamily="34" charset="0"/>
+                  <a:cs typeface="Arial" panose="020B0604020202020204" pitchFamily="34" charset="0"/>
+                </a:rPr>
+                <a:t>ecological preferences</a:t>
+              </a:r>
+            </a:p>
+            <a:p>
+              <a:pPr marL="285750" indent="-173038">
+                <a:buFont typeface="Arial" panose="020B0604020202020204" pitchFamily="34" charset="0"/>
+                <a:buChar char="•"/>
+                <a:tabLst>
+                  <a:tab pos="1250950" algn="l"/>
+                </a:tabLst>
+              </a:pPr>
+              <a:r>
+                <a:rPr lang="en-US" sz="1400" dirty="0">
+                  <a:solidFill>
+                    <a:schemeClr val="bg1"/>
+                  </a:solidFill>
+                  <a:latin typeface="Galvji" panose="020B0504020202020204" pitchFamily="34" charset="0"/>
+                  <a:cs typeface="Arial" panose="020B0604020202020204" pitchFamily="34" charset="0"/>
+                </a:rPr>
+                <a:t>dispersal limitation</a:t>
+              </a:r>
+            </a:p>
+            <a:p>
+              <a:pPr marL="285750" indent="-173038">
+                <a:buFont typeface="Arial" panose="020B0604020202020204" pitchFamily="34" charset="0"/>
+                <a:buChar char="•"/>
+                <a:tabLst>
+                  <a:tab pos="1250950" algn="l"/>
+                </a:tabLst>
+              </a:pPr>
+              <a:r>
+                <a:rPr lang="en-US" sz="1400" dirty="0">
+                  <a:solidFill>
+                    <a:schemeClr val="bg1"/>
+                  </a:solidFill>
+                  <a:latin typeface="Galvji" panose="020B0504020202020204" pitchFamily="34" charset="0"/>
+                  <a:cs typeface="Arial" panose="020B0604020202020204" pitchFamily="34" charset="0"/>
+                </a:rPr>
+                <a:t>biotic </a:t>
+              </a:r>
+              <a:r>
+                <a:rPr lang="en-US" sz="1400" dirty="0" smtClean="0">
+                  <a:solidFill>
+                    <a:schemeClr val="bg1"/>
+                  </a:solidFill>
+                  <a:latin typeface="Galvji" panose="020B0504020202020204" pitchFamily="34" charset="0"/>
+                  <a:cs typeface="Arial" panose="020B0604020202020204" pitchFamily="34" charset="0"/>
+                </a:rPr>
+                <a:t>interactions</a:t>
+              </a:r>
+            </a:p>
+          </p:txBody>
+        </p:sp>
+        <p:sp>
+          <p:nvSpPr>
+            <p:cNvPr id="13" name="Pentagon 12"/>
+            <p:cNvSpPr/>
+            <p:nvPr/>
+          </p:nvSpPr>
+          <p:spPr>
+            <a:xfrm>
+              <a:off x="8603462" y="1645546"/>
+              <a:ext cx="2651760" cy="1463040"/>
+            </a:xfrm>
+            <a:prstGeom prst="homePlate">
+              <a:avLst>
+                <a:gd name="adj" fmla="val 20395"/>
+              </a:avLst>
+            </a:prstGeom>
+            <a:solidFill>
+              <a:schemeClr val="bg2">
+                <a:lumMod val="75000"/>
+              </a:schemeClr>
+            </a:solidFill>
+            <a:ln>
+              <a:noFill/>
+            </a:ln>
+          </p:spPr>
+          <p:style>
+            <a:lnRef idx="2">
+              <a:schemeClr val="accent1">
+                <a:shade val="50000"/>
+              </a:schemeClr>
+            </a:lnRef>
+            <a:fillRef idx="1">
+              <a:schemeClr val="accent1"/>
+            </a:fillRef>
+            <a:effectRef idx="0">
+              <a:schemeClr val="accent1"/>
+            </a:effectRef>
+            <a:fontRef idx="minor">
+              <a:schemeClr val="lt1"/>
+            </a:fontRef>
+          </p:style>
+          <p:txBody>
+            <a:bodyPr rtlCol="0" anchor="ctr"/>
+            <a:lstStyle/>
+            <a:p>
+              <a:pPr algn="ctr"/>
+              <a:r>
+                <a:rPr lang="en-US" sz="1600" dirty="0" smtClean="0">
+                  <a:solidFill>
+                    <a:schemeClr val="bg1"/>
+                  </a:solidFill>
+                  <a:latin typeface="Galvji" panose="020B0504020202020204" pitchFamily="34" charset="0"/>
+                  <a:cs typeface="Arial" panose="020B0604020202020204" pitchFamily="34" charset="0"/>
+                </a:rPr>
+                <a:t>presence-absence </a:t>
+              </a:r>
+              <a:r>
+                <a:rPr lang="en-US" sz="1600" dirty="0">
+                  <a:solidFill>
+                    <a:schemeClr val="bg1"/>
+                  </a:solidFill>
+                  <a:latin typeface="Galvji" panose="020B0504020202020204" pitchFamily="34" charset="0"/>
+                  <a:cs typeface="Arial" panose="020B0604020202020204" pitchFamily="34" charset="0"/>
+                </a:rPr>
+                <a:t/>
+              </a:r>
+              <a:br>
+                <a:rPr lang="en-US" sz="1600" dirty="0">
+                  <a:solidFill>
+                    <a:schemeClr val="bg1"/>
+                  </a:solidFill>
+                  <a:latin typeface="Galvji" panose="020B0504020202020204" pitchFamily="34" charset="0"/>
+                  <a:cs typeface="Arial" panose="020B0604020202020204" pitchFamily="34" charset="0"/>
+                </a:rPr>
+              </a:br>
+              <a:r>
+                <a:rPr lang="en-US" sz="1600" dirty="0" smtClean="0">
+                  <a:solidFill>
+                    <a:schemeClr val="bg1"/>
+                  </a:solidFill>
+                  <a:latin typeface="Galvji" panose="020B0504020202020204" pitchFamily="34" charset="0"/>
+                  <a:cs typeface="Arial" panose="020B0604020202020204" pitchFamily="34" charset="0"/>
+                </a:rPr>
+                <a:t>35 “virtual” taxa</a:t>
+              </a:r>
+              <a:endParaRPr lang="en-US" sz="1600" dirty="0">
+                <a:solidFill>
+                  <a:schemeClr val="bg1"/>
+                </a:solidFill>
+                <a:latin typeface="Galvji" panose="020B0504020202020204" pitchFamily="34" charset="0"/>
+                <a:cs typeface="Arial" panose="020B0604020202020204" pitchFamily="34" charset="0"/>
+              </a:endParaRPr>
+            </a:p>
+          </p:txBody>
+        </p:sp>
+        <p:sp>
+          <p:nvSpPr>
+            <p:cNvPr id="15" name="Pentagon 14"/>
+            <p:cNvSpPr/>
+            <p:nvPr/>
+          </p:nvSpPr>
+          <p:spPr>
+            <a:xfrm>
+              <a:off x="2671866" y="1665651"/>
+              <a:ext cx="2651760" cy="1463040"/>
+            </a:xfrm>
+            <a:prstGeom prst="homePlate">
+              <a:avLst>
+                <a:gd name="adj" fmla="val 17106"/>
+              </a:avLst>
+            </a:prstGeom>
+            <a:solidFill>
+              <a:schemeClr val="bg2">
+                <a:lumMod val="75000"/>
+              </a:schemeClr>
+            </a:solidFill>
+            <a:ln>
+              <a:noFill/>
+            </a:ln>
+          </p:spPr>
+          <p:style>
+            <a:lnRef idx="2">
+              <a:schemeClr val="accent1">
+                <a:shade val="50000"/>
+              </a:schemeClr>
+            </a:lnRef>
+            <a:fillRef idx="1">
+              <a:schemeClr val="accent1"/>
+            </a:fillRef>
+            <a:effectRef idx="0">
+              <a:schemeClr val="accent1"/>
+            </a:effectRef>
+            <a:fontRef idx="minor">
+              <a:schemeClr val="lt1"/>
+            </a:fontRef>
+          </p:style>
+          <p:txBody>
+            <a:bodyPr rtlCol="0" anchor="ctr"/>
+            <a:lstStyle/>
+            <a:p>
+              <a:pPr algn="ctr"/>
+              <a:r>
+                <a:rPr lang="en-US" sz="1600" dirty="0">
+                  <a:solidFill>
+                    <a:schemeClr val="bg1"/>
+                  </a:solidFill>
+                  <a:latin typeface="Galvji" panose="020B0504020202020204" pitchFamily="34" charset="0"/>
+                  <a:cs typeface="Arial" panose="020B0604020202020204" pitchFamily="34" charset="0"/>
+                </a:rPr>
+                <a:t>8</a:t>
+              </a:r>
+              <a:r>
+                <a:rPr lang="en-US" sz="1600" dirty="0" smtClean="0">
+                  <a:solidFill>
+                    <a:schemeClr val="bg1"/>
+                  </a:solidFill>
+                  <a:latin typeface="Galvji" panose="020B0504020202020204" pitchFamily="34" charset="0"/>
+                  <a:cs typeface="Arial" panose="020B0604020202020204" pitchFamily="34" charset="0"/>
+                </a:rPr>
+                <a:t> </a:t>
+              </a:r>
+              <a:r>
+                <a:rPr lang="en-US" sz="1600" dirty="0">
+                  <a:solidFill>
+                    <a:schemeClr val="bg1"/>
+                  </a:solidFill>
+                  <a:latin typeface="Galvji" panose="020B0504020202020204" pitchFamily="34" charset="0"/>
+                  <a:cs typeface="Arial" panose="020B0604020202020204" pitchFamily="34" charset="0"/>
+                </a:rPr>
+                <a:t>environmental </a:t>
+              </a:r>
+              <a:r>
+                <a:rPr lang="en-US" sz="1600" dirty="0" smtClean="0">
+                  <a:solidFill>
+                    <a:schemeClr val="bg1"/>
+                  </a:solidFill>
+                  <a:latin typeface="Galvji" panose="020B0504020202020204" pitchFamily="34" charset="0"/>
+                  <a:cs typeface="Arial" panose="020B0604020202020204" pitchFamily="34" charset="0"/>
+                </a:rPr>
+                <a:t/>
+              </a:r>
+              <a:br>
+                <a:rPr lang="en-US" sz="1600" dirty="0" smtClean="0">
+                  <a:solidFill>
+                    <a:schemeClr val="bg1"/>
+                  </a:solidFill>
+                  <a:latin typeface="Galvji" panose="020B0504020202020204" pitchFamily="34" charset="0"/>
+                  <a:cs typeface="Arial" panose="020B0604020202020204" pitchFamily="34" charset="0"/>
+                </a:rPr>
+              </a:br>
+              <a:r>
+                <a:rPr lang="en-US" sz="1600" dirty="0" smtClean="0">
+                  <a:solidFill>
+                    <a:schemeClr val="bg1"/>
+                  </a:solidFill>
+                  <a:latin typeface="Galvji" panose="020B0504020202020204" pitchFamily="34" charset="0"/>
+                  <a:cs typeface="Arial" panose="020B0604020202020204" pitchFamily="34" charset="0"/>
+                </a:rPr>
+                <a:t>predictors</a:t>
+              </a:r>
+              <a:endParaRPr lang="en-US" sz="1600" dirty="0">
+                <a:solidFill>
+                  <a:schemeClr val="bg1"/>
+                </a:solidFill>
+                <a:latin typeface="Galvji" panose="020B0504020202020204" pitchFamily="34" charset="0"/>
+                <a:cs typeface="Arial" panose="020B0604020202020204" pitchFamily="34" charset="0"/>
+              </a:endParaRPr>
+            </a:p>
+          </p:txBody>
+        </p:sp>
+      </p:grpSp>
+      <p:pic>
+        <p:nvPicPr>
+          <p:cNvPr id="3" name="Picture 3">
+            <a:extLst>
+              <a:ext uri="{FF2B5EF4-FFF2-40B4-BE49-F238E27FC236}">
+                <a16:creationId xmlns:a16="http://schemas.microsoft.com/office/drawing/2014/main" id="{33AC184E-87C7-0EF4-3241-D63D3E477BE2}"/>
+              </a:ext>
+            </a:extLst>
+          </p:cNvPr>
+          <p:cNvPicPr>
+            <a:picLocks noChangeAspect="1"/>
+          </p:cNvPicPr>
+          <p:nvPr/>
+        </p:nvPicPr>
+        <p:blipFill>
+          <a:blip r:embed="rId2" cstate="print">
+            <a:extLst>
+              <a:ext uri="{28A0092B-C50C-407E-A947-70E740481C1C}">
+                <a14:useLocalDpi xmlns:a14="http://schemas.microsoft.com/office/drawing/2010/main" val="0"/>
+              </a:ext>
+            </a:extLst>
+          </a:blip>
+          <a:stretch>
+            <a:fillRect/>
+          </a:stretch>
+        </p:blipFill>
+        <p:spPr>
+          <a:xfrm>
+            <a:off x="600968" y="436323"/>
+            <a:ext cx="923032" cy="198440"/>
+          </a:xfrm>
+          <a:prstGeom prst="rect">
+            <a:avLst/>
+          </a:prstGeom>
+        </p:spPr>
+      </p:pic>
+      <p:pic>
+        <p:nvPicPr>
+          <p:cNvPr id="4" name="Picture 4">
+            <a:extLst>
+              <a:ext uri="{FF2B5EF4-FFF2-40B4-BE49-F238E27FC236}">
+                <a16:creationId xmlns:a16="http://schemas.microsoft.com/office/drawing/2014/main" id="{1FF070A2-01F6-794E-6535-C7F6261F0698}"/>
+              </a:ext>
+            </a:extLst>
+          </p:cNvPr>
+          <p:cNvPicPr>
+            <a:picLocks noChangeAspect="1"/>
+          </p:cNvPicPr>
+          <p:nvPr/>
+        </p:nvPicPr>
+        <p:blipFill>
+          <a:blip r:embed="rId3" cstate="print">
+            <a:extLst>
+              <a:ext uri="{28A0092B-C50C-407E-A947-70E740481C1C}">
+                <a14:useLocalDpi xmlns:a14="http://schemas.microsoft.com/office/drawing/2010/main" val="0"/>
+              </a:ext>
+            </a:extLst>
+          </a:blip>
+          <a:stretch>
+            <a:fillRect/>
+          </a:stretch>
+        </p:blipFill>
+        <p:spPr>
+          <a:xfrm>
+            <a:off x="10529988" y="296755"/>
+            <a:ext cx="1061044" cy="387452"/>
+          </a:xfrm>
+          <a:prstGeom prst="rect">
+            <a:avLst/>
+          </a:prstGeom>
+        </p:spPr>
+      </p:pic>
+      <p:cxnSp>
+        <p:nvCxnSpPr>
+          <p:cNvPr id="31" name="Connecteur droit 4">
+            <a:extLst>
+              <a:ext uri="{FF2B5EF4-FFF2-40B4-BE49-F238E27FC236}">
+                <a16:creationId xmlns:a16="http://schemas.microsoft.com/office/drawing/2014/main" id="{A5601D80-9D67-4C3D-5DAF-C6FDFAF80ECD}"/>
+              </a:ext>
+            </a:extLst>
+          </p:cNvPr>
+          <p:cNvCxnSpPr>
+            <a:cxnSpLocks/>
+          </p:cNvCxnSpPr>
+          <p:nvPr/>
+        </p:nvCxnSpPr>
+        <p:spPr>
+          <a:xfrm>
+            <a:off x="2238695" y="1081263"/>
+            <a:ext cx="0" cy="5120640"/>
+          </a:xfrm>
+          <a:prstGeom prst="line">
+            <a:avLst/>
+          </a:prstGeom>
+          <a:ln w="12700"/>
+        </p:spPr>
+        <p:style>
+          <a:lnRef idx="1">
+            <a:schemeClr val="dk1"/>
+          </a:lnRef>
+          <a:fillRef idx="0">
+            <a:schemeClr val="dk1"/>
+          </a:fillRef>
+          <a:effectRef idx="0">
+            <a:schemeClr val="dk1"/>
+          </a:effectRef>
+          <a:fontRef idx="minor">
+            <a:schemeClr val="tx1"/>
+          </a:fontRef>
+        </p:style>
+      </p:cxnSp>
+      <p:sp>
+        <p:nvSpPr>
+          <p:cNvPr id="37" name="TextBox 36"/>
+          <p:cNvSpPr txBox="1"/>
+          <p:nvPr/>
+        </p:nvSpPr>
+        <p:spPr>
+          <a:xfrm>
+            <a:off x="549480" y="1641584"/>
+            <a:ext cx="1610294" cy="1015663"/>
+          </a:xfrm>
+          <a:prstGeom prst="rect">
+            <a:avLst/>
+          </a:prstGeom>
+          <a:noFill/>
+        </p:spPr>
+        <p:txBody>
+          <a:bodyPr wrap="square" rtlCol="0">
+            <a:spAutoFit/>
+          </a:bodyPr>
+          <a:lstStyle/>
+          <a:p>
+            <a:r>
+              <a:rPr lang="en-US" sz="2000" b="1" dirty="0" smtClean="0">
+                <a:latin typeface="Galvji" panose="020B0504020202020204" pitchFamily="34" charset="77"/>
+                <a:cs typeface="Arial" panose="020B0604020202020204" pitchFamily="34" charset="0"/>
+              </a:rPr>
+              <a:t>Artificial Data</a:t>
+            </a:r>
+          </a:p>
+          <a:p>
+            <a:r>
+              <a:rPr lang="en-US" sz="2000" b="1" dirty="0" smtClean="0">
+                <a:latin typeface="Galvji" panose="020B0504020202020204" pitchFamily="34" charset="77"/>
+                <a:cs typeface="Arial" panose="020B0604020202020204" pitchFamily="34" charset="0"/>
+              </a:rPr>
+              <a:t>Generation</a:t>
+            </a:r>
+            <a:endParaRPr lang="en-US" sz="2000" b="1" dirty="0">
+              <a:latin typeface="Galvji" panose="020B0504020202020204" pitchFamily="34" charset="77"/>
+              <a:cs typeface="Arial" panose="020B0604020202020204" pitchFamily="34" charset="0"/>
+            </a:endParaRPr>
+          </a:p>
+        </p:txBody>
+      </p:sp>
+      <p:sp>
+        <p:nvSpPr>
+          <p:cNvPr id="38" name="TextBox 37"/>
+          <p:cNvSpPr txBox="1"/>
+          <p:nvPr/>
+        </p:nvSpPr>
+        <p:spPr>
+          <a:xfrm>
+            <a:off x="549480" y="3222223"/>
+            <a:ext cx="1610294" cy="1015663"/>
+          </a:xfrm>
+          <a:prstGeom prst="rect">
+            <a:avLst/>
+          </a:prstGeom>
+          <a:noFill/>
+        </p:spPr>
+        <p:txBody>
+          <a:bodyPr wrap="square" rtlCol="0">
+            <a:spAutoFit/>
+          </a:bodyPr>
+          <a:lstStyle/>
+          <a:p>
+            <a:r>
+              <a:rPr lang="en-US" sz="2000" b="1" dirty="0" smtClean="0">
+                <a:latin typeface="Galvji" panose="020B0504020202020204" pitchFamily="34" charset="77"/>
+                <a:cs typeface="Arial" panose="020B0604020202020204" pitchFamily="34" charset="0"/>
+              </a:rPr>
+              <a:t>Data Limitation</a:t>
+            </a:r>
+          </a:p>
+          <a:p>
+            <a:r>
+              <a:rPr lang="en-US" sz="2000" b="1" dirty="0" smtClean="0">
+                <a:latin typeface="Galvji" panose="020B0504020202020204" pitchFamily="34" charset="77"/>
+                <a:cs typeface="Arial" panose="020B0604020202020204" pitchFamily="34" charset="0"/>
+              </a:rPr>
+              <a:t>Scenarios</a:t>
+            </a:r>
+            <a:endParaRPr lang="en-US" b="1" dirty="0">
+              <a:latin typeface="Galvji" panose="020B0504020202020204" pitchFamily="34" charset="77"/>
+              <a:cs typeface="Arial" panose="020B0604020202020204" pitchFamily="34" charset="0"/>
+            </a:endParaRPr>
+          </a:p>
+        </p:txBody>
+      </p:sp>
+      <p:sp>
+        <p:nvSpPr>
+          <p:cNvPr id="39" name="TextBox 38"/>
+          <p:cNvSpPr txBox="1"/>
+          <p:nvPr/>
+        </p:nvSpPr>
+        <p:spPr>
+          <a:xfrm>
+            <a:off x="596317" y="4936288"/>
+            <a:ext cx="1610294" cy="707886"/>
+          </a:xfrm>
+          <a:prstGeom prst="rect">
+            <a:avLst/>
+          </a:prstGeom>
+          <a:noFill/>
+        </p:spPr>
+        <p:txBody>
+          <a:bodyPr wrap="square" rtlCol="0">
+            <a:spAutoFit/>
+          </a:bodyPr>
+          <a:lstStyle/>
+          <a:p>
+            <a:r>
+              <a:rPr lang="en-US" sz="2000" b="1" dirty="0" smtClean="0">
+                <a:latin typeface="Galvji" panose="020B0504020202020204" pitchFamily="34" charset="77"/>
+                <a:cs typeface="Arial" panose="020B0604020202020204" pitchFamily="34" charset="0"/>
+              </a:rPr>
+              <a:t>SDMs Evaluation</a:t>
+            </a:r>
+            <a:endParaRPr lang="en-US" b="1" dirty="0">
+              <a:latin typeface="Galvji" panose="020B0504020202020204" pitchFamily="34" charset="77"/>
+              <a:cs typeface="Arial" panose="020B0604020202020204" pitchFamily="34" charset="0"/>
+            </a:endParaRPr>
+          </a:p>
+        </p:txBody>
+      </p:sp>
+      <p:pic>
+        <p:nvPicPr>
+          <p:cNvPr id="41" name="Picture 40"/>
+          <p:cNvPicPr>
+            <a:picLocks noChangeAspect="1"/>
+          </p:cNvPicPr>
+          <p:nvPr/>
+        </p:nvPicPr>
+        <p:blipFill>
+          <a:blip r:embed="rId4" cstate="print">
+            <a:duotone>
+              <a:prstClr val="black"/>
+              <a:srgbClr val="7030A0">
+                <a:tint val="45000"/>
+                <a:satMod val="400000"/>
+              </a:srgbClr>
+            </a:duotone>
+            <a:extLst>
+              <a:ext uri="{28A0092B-C50C-407E-A947-70E740481C1C}">
+                <a14:useLocalDpi xmlns:a14="http://schemas.microsoft.com/office/drawing/2010/main" val="0"/>
+              </a:ext>
+            </a:extLst>
+          </a:blip>
+          <a:stretch>
+            <a:fillRect/>
+          </a:stretch>
+        </p:blipFill>
+        <p:spPr>
+          <a:xfrm rot="6099432">
+            <a:off x="11519145" y="6233687"/>
+            <a:ext cx="537185" cy="379807"/>
+          </a:xfrm>
+          <a:prstGeom prst="rect">
+            <a:avLst/>
+          </a:prstGeom>
+        </p:spPr>
+      </p:pic>
+      <p:cxnSp>
+        <p:nvCxnSpPr>
+          <p:cNvPr id="43" name="Connecteur droit 8">
+            <a:extLst>
+              <a:ext uri="{FF2B5EF4-FFF2-40B4-BE49-F238E27FC236}">
+                <a16:creationId xmlns:a16="http://schemas.microsoft.com/office/drawing/2014/main" id="{4BB7996A-92C0-B07B-0850-938073871F4A}"/>
+              </a:ext>
+            </a:extLst>
+          </p:cNvPr>
+          <p:cNvCxnSpPr/>
+          <p:nvPr/>
+        </p:nvCxnSpPr>
+        <p:spPr>
+          <a:xfrm>
+            <a:off x="565508" y="1246324"/>
+            <a:ext cx="10981972" cy="0"/>
+          </a:xfrm>
+          <a:prstGeom prst="line">
+            <a:avLst/>
+          </a:prstGeom>
+        </p:spPr>
+        <p:style>
+          <a:lnRef idx="1">
+            <a:schemeClr val="dk1"/>
+          </a:lnRef>
+          <a:fillRef idx="0">
+            <a:schemeClr val="dk1"/>
+          </a:fillRef>
+          <a:effectRef idx="0">
+            <a:schemeClr val="dk1"/>
+          </a:effectRef>
+          <a:fontRef idx="minor">
+            <a:schemeClr val="tx1"/>
+          </a:fontRef>
+        </p:style>
+      </p:cxnSp>
+      <p:grpSp>
+        <p:nvGrpSpPr>
+          <p:cNvPr id="45" name="Group 44"/>
+          <p:cNvGrpSpPr/>
+          <p:nvPr/>
+        </p:nvGrpSpPr>
+        <p:grpSpPr>
+          <a:xfrm>
+            <a:off x="2494066" y="4604431"/>
+            <a:ext cx="8583356" cy="1468591"/>
+            <a:chOff x="2671866" y="4604431"/>
+            <a:chExt cx="8583356" cy="1468591"/>
+          </a:xfrm>
+        </p:grpSpPr>
+        <p:grpSp>
+          <p:nvGrpSpPr>
+            <p:cNvPr id="18" name="Group 17"/>
+            <p:cNvGrpSpPr/>
+            <p:nvPr/>
+          </p:nvGrpSpPr>
+          <p:grpSpPr>
+            <a:xfrm>
+              <a:off x="2671866" y="4608620"/>
+              <a:ext cx="8583356" cy="1464402"/>
+              <a:chOff x="1998102" y="4716036"/>
+              <a:chExt cx="8583356" cy="1464402"/>
+            </a:xfrm>
+          </p:grpSpPr>
+          <p:sp>
+            <p:nvSpPr>
+              <p:cNvPr id="21" name="Pentagon 20"/>
+              <p:cNvSpPr/>
+              <p:nvPr/>
+            </p:nvSpPr>
+            <p:spPr>
+              <a:xfrm>
+                <a:off x="4978396" y="4717398"/>
+                <a:ext cx="2651760" cy="1463040"/>
+              </a:xfrm>
+              <a:prstGeom prst="homePlate">
+                <a:avLst>
+                  <a:gd name="adj" fmla="val 23684"/>
+                </a:avLst>
+              </a:prstGeom>
+              <a:solidFill>
+                <a:schemeClr val="bg2">
+                  <a:lumMod val="75000"/>
+                </a:schemeClr>
+              </a:solidFill>
+              <a:ln>
+                <a:noFill/>
+              </a:ln>
+            </p:spPr>
+            <p:style>
+              <a:lnRef idx="2">
+                <a:schemeClr val="accent1">
+                  <a:shade val="50000"/>
+                </a:schemeClr>
+              </a:lnRef>
+              <a:fillRef idx="1">
+                <a:schemeClr val="accent1"/>
+              </a:fillRef>
+              <a:effectRef idx="0">
+                <a:schemeClr val="accent1"/>
+              </a:effectRef>
+              <a:fontRef idx="minor">
+                <a:schemeClr val="lt1"/>
+              </a:fontRef>
+            </p:style>
+            <p:txBody>
+              <a:bodyPr rtlCol="0" anchor="ctr"/>
+              <a:lstStyle/>
+              <a:p>
+                <a:pPr algn="ctr">
+                  <a:spcAft>
+                    <a:spcPts val="1200"/>
+                  </a:spcAft>
+                </a:pPr>
+                <a:r>
+                  <a:rPr lang="en-US" sz="1600" dirty="0" smtClean="0">
+                    <a:solidFill>
+                      <a:schemeClr val="bg1"/>
+                    </a:solidFill>
+                    <a:latin typeface="Galvji" panose="020B0504020202020204" pitchFamily="34" charset="0"/>
+                    <a:cs typeface="Arial" panose="020B0604020202020204" pitchFamily="34" charset="0"/>
+                  </a:rPr>
+                  <a:t>Species Distribution Models (SDMs)</a:t>
+                </a:r>
+              </a:p>
+              <a:p>
+                <a:pPr algn="ctr">
+                  <a:spcAft>
+                    <a:spcPts val="1200"/>
+                  </a:spcAft>
+                </a:pPr>
+                <a:r>
+                  <a:rPr lang="en-US" sz="1600" b="1" dirty="0" smtClean="0">
+                    <a:solidFill>
+                      <a:schemeClr val="bg1"/>
+                    </a:solidFill>
+                    <a:latin typeface="Galvji" panose="020B0504020202020204" pitchFamily="34" charset="0"/>
+                    <a:cs typeface="Arial" panose="020B0604020202020204" pitchFamily="34" charset="0"/>
+                  </a:rPr>
+                  <a:t>GLM, GAM, RF, ANN</a:t>
+                </a:r>
+              </a:p>
+            </p:txBody>
+          </p:sp>
+          <p:sp>
+            <p:nvSpPr>
+              <p:cNvPr id="24" name="Pentagon 23"/>
+              <p:cNvSpPr/>
+              <p:nvPr/>
+            </p:nvSpPr>
+            <p:spPr>
+              <a:xfrm>
+                <a:off x="7929698" y="4716036"/>
+                <a:ext cx="2651760" cy="1463040"/>
+              </a:xfrm>
+              <a:prstGeom prst="homePlate">
+                <a:avLst>
+                  <a:gd name="adj" fmla="val 22588"/>
+                </a:avLst>
+              </a:prstGeom>
+              <a:solidFill>
+                <a:schemeClr val="bg2">
+                  <a:lumMod val="75000"/>
+                </a:schemeClr>
+              </a:solidFill>
+              <a:ln>
+                <a:noFill/>
+              </a:ln>
+            </p:spPr>
+            <p:style>
+              <a:lnRef idx="2">
+                <a:schemeClr val="accent1">
+                  <a:shade val="50000"/>
+                </a:schemeClr>
+              </a:lnRef>
+              <a:fillRef idx="1">
+                <a:schemeClr val="accent1"/>
+              </a:fillRef>
+              <a:effectRef idx="0">
+                <a:schemeClr val="accent1"/>
+              </a:effectRef>
+              <a:fontRef idx="minor">
+                <a:schemeClr val="lt1"/>
+              </a:fontRef>
+            </p:style>
+            <p:txBody>
+              <a:bodyPr rtlCol="0" anchor="ctr"/>
+              <a:lstStyle/>
+              <a:p>
+                <a:pPr algn="ctr"/>
+                <a:r>
+                  <a:rPr lang="en-US" sz="1600" dirty="0">
+                    <a:solidFill>
+                      <a:schemeClr val="bg1"/>
+                    </a:solidFill>
+                    <a:latin typeface="Galvji" panose="020B0504020202020204" pitchFamily="34" charset="0"/>
+                    <a:cs typeface="Arial" panose="020B0604020202020204" pitchFamily="34" charset="0"/>
+                  </a:rPr>
+                  <a:t>p</a:t>
+                </a:r>
+                <a:r>
+                  <a:rPr lang="en-US" sz="1600" dirty="0" smtClean="0">
+                    <a:solidFill>
+                      <a:schemeClr val="bg1"/>
+                    </a:solidFill>
+                    <a:latin typeface="Galvji" panose="020B0504020202020204" pitchFamily="34" charset="0"/>
+                    <a:cs typeface="Arial" panose="020B0604020202020204" pitchFamily="34" charset="0"/>
+                  </a:rPr>
+                  <a:t>robability of </a:t>
+                </a:r>
+                <a:br>
+                  <a:rPr lang="en-US" sz="1600" dirty="0" smtClean="0">
+                    <a:solidFill>
+                      <a:schemeClr val="bg1"/>
+                    </a:solidFill>
+                    <a:latin typeface="Galvji" panose="020B0504020202020204" pitchFamily="34" charset="0"/>
+                    <a:cs typeface="Arial" panose="020B0604020202020204" pitchFamily="34" charset="0"/>
+                  </a:rPr>
+                </a:br>
+                <a:r>
+                  <a:rPr lang="en-US" sz="1600" dirty="0" smtClean="0">
+                    <a:solidFill>
+                      <a:schemeClr val="bg1"/>
+                    </a:solidFill>
+                    <a:latin typeface="Galvji" panose="020B0504020202020204" pitchFamily="34" charset="0"/>
+                    <a:cs typeface="Arial" panose="020B0604020202020204" pitchFamily="34" charset="0"/>
+                  </a:rPr>
+                  <a:t>occurrence</a:t>
+                </a:r>
+                <a:endParaRPr lang="en-US" sz="1600" dirty="0">
+                  <a:solidFill>
+                    <a:schemeClr val="bg1"/>
+                  </a:solidFill>
+                  <a:latin typeface="Galvji" panose="020B0504020202020204" pitchFamily="34" charset="0"/>
+                  <a:cs typeface="Arial" panose="020B0604020202020204" pitchFamily="34" charset="0"/>
+                </a:endParaRPr>
+              </a:p>
+            </p:txBody>
+          </p:sp>
+          <p:sp>
+            <p:nvSpPr>
+              <p:cNvPr id="26" name="Pentagon 25"/>
+              <p:cNvSpPr/>
+              <p:nvPr/>
+            </p:nvSpPr>
+            <p:spPr>
+              <a:xfrm>
+                <a:off x="1998102" y="5493276"/>
+                <a:ext cx="2651760" cy="685800"/>
+              </a:xfrm>
+              <a:prstGeom prst="homePlate">
+                <a:avLst>
+                  <a:gd name="adj" fmla="val 16009"/>
+                </a:avLst>
+              </a:prstGeom>
+              <a:solidFill>
+                <a:schemeClr val="bg2">
+                  <a:lumMod val="75000"/>
+                </a:schemeClr>
+              </a:solidFill>
+              <a:ln>
+                <a:noFill/>
+              </a:ln>
+            </p:spPr>
+            <p:style>
+              <a:lnRef idx="2">
+                <a:schemeClr val="accent1">
+                  <a:shade val="50000"/>
+                </a:schemeClr>
+              </a:lnRef>
+              <a:fillRef idx="1">
+                <a:schemeClr val="accent1"/>
+              </a:fillRef>
+              <a:effectRef idx="0">
+                <a:schemeClr val="accent1"/>
+              </a:effectRef>
+              <a:fontRef idx="minor">
+                <a:schemeClr val="lt1"/>
+              </a:fontRef>
+            </p:style>
+            <p:txBody>
+              <a:bodyPr rtlCol="0" anchor="ctr"/>
+              <a:lstStyle/>
+              <a:p>
+                <a:pPr algn="ctr"/>
+                <a:r>
+                  <a:rPr lang="en-US" sz="1600" dirty="0" smtClean="0">
+                    <a:solidFill>
+                      <a:schemeClr val="bg1"/>
+                    </a:solidFill>
+                    <a:latin typeface="Galvji" panose="020B0504020202020204" pitchFamily="34" charset="0"/>
+                    <a:cs typeface="Arial" panose="020B0604020202020204" pitchFamily="34" charset="0"/>
+                  </a:rPr>
+                  <a:t>environmental </a:t>
+                </a:r>
+                <a:br>
+                  <a:rPr lang="en-US" sz="1600" dirty="0" smtClean="0">
+                    <a:solidFill>
+                      <a:schemeClr val="bg1"/>
+                    </a:solidFill>
+                    <a:latin typeface="Galvji" panose="020B0504020202020204" pitchFamily="34" charset="0"/>
+                    <a:cs typeface="Arial" panose="020B0604020202020204" pitchFamily="34" charset="0"/>
+                  </a:rPr>
+                </a:br>
+                <a:r>
+                  <a:rPr lang="en-US" sz="1600" dirty="0" smtClean="0">
+                    <a:solidFill>
+                      <a:schemeClr val="bg1"/>
+                    </a:solidFill>
+                    <a:latin typeface="Galvji" panose="020B0504020202020204" pitchFamily="34" charset="0"/>
+                    <a:cs typeface="Arial" panose="020B0604020202020204" pitchFamily="34" charset="0"/>
+                  </a:rPr>
+                  <a:t>predictors</a:t>
+                </a:r>
+              </a:p>
+            </p:txBody>
+          </p:sp>
+        </p:grpSp>
+        <p:sp>
+          <p:nvSpPr>
+            <p:cNvPr id="44" name="Pentagon 43"/>
+            <p:cNvSpPr/>
+            <p:nvPr/>
+          </p:nvSpPr>
+          <p:spPr>
+            <a:xfrm>
+              <a:off x="2671866" y="4604431"/>
+              <a:ext cx="2651760" cy="685800"/>
+            </a:xfrm>
+            <a:prstGeom prst="homePlate">
+              <a:avLst>
+                <a:gd name="adj" fmla="val 16009"/>
+              </a:avLst>
+            </a:prstGeom>
+            <a:solidFill>
+              <a:schemeClr val="bg2">
+                <a:lumMod val="75000"/>
+              </a:schemeClr>
+            </a:solidFill>
+            <a:ln>
+              <a:noFill/>
+            </a:ln>
+          </p:spPr>
+          <p:style>
+            <a:lnRef idx="2">
+              <a:schemeClr val="accent1">
+                <a:shade val="50000"/>
+              </a:schemeClr>
+            </a:lnRef>
+            <a:fillRef idx="1">
+              <a:schemeClr val="accent1"/>
+            </a:fillRef>
+            <a:effectRef idx="0">
+              <a:schemeClr val="accent1"/>
+            </a:effectRef>
+            <a:fontRef idx="minor">
+              <a:schemeClr val="lt1"/>
+            </a:fontRef>
+          </p:style>
+          <p:txBody>
+            <a:bodyPr rtlCol="0" anchor="ctr"/>
+            <a:lstStyle/>
+            <a:p>
+              <a:pPr algn="ctr"/>
+              <a:r>
+                <a:rPr lang="en-US" sz="1600" dirty="0">
+                  <a:solidFill>
+                    <a:schemeClr val="bg1"/>
+                  </a:solidFill>
+                  <a:latin typeface="Galvji" panose="020B0504020202020204" pitchFamily="34" charset="0"/>
+                  <a:cs typeface="Arial" panose="020B0604020202020204" pitchFamily="34" charset="0"/>
+                </a:rPr>
+                <a:t>p</a:t>
+              </a:r>
+              <a:r>
+                <a:rPr lang="en-US" sz="1600" dirty="0" smtClean="0">
+                  <a:solidFill>
+                    <a:schemeClr val="bg1"/>
+                  </a:solidFill>
+                  <a:latin typeface="Galvji" panose="020B0504020202020204" pitchFamily="34" charset="0"/>
+                  <a:cs typeface="Arial" panose="020B0604020202020204" pitchFamily="34" charset="0"/>
+                </a:rPr>
+                <a:t>resence-absence virtual taxa</a:t>
+              </a:r>
+              <a:endParaRPr lang="en-US" sz="1600" dirty="0">
+                <a:solidFill>
+                  <a:schemeClr val="bg1"/>
+                </a:solidFill>
+                <a:latin typeface="Galvji" panose="020B0504020202020204" pitchFamily="34" charset="0"/>
+                <a:cs typeface="Arial" panose="020B0604020202020204" pitchFamily="34" charset="0"/>
+              </a:endParaRPr>
+            </a:p>
+          </p:txBody>
+        </p:sp>
+      </p:grpSp>
+      <p:grpSp>
+        <p:nvGrpSpPr>
+          <p:cNvPr id="6" name="Group 5"/>
+          <p:cNvGrpSpPr/>
+          <p:nvPr/>
+        </p:nvGrpSpPr>
+        <p:grpSpPr>
+          <a:xfrm>
+            <a:off x="3560269" y="3121652"/>
+            <a:ext cx="6294665" cy="1296475"/>
+            <a:chOff x="4171949" y="3088664"/>
+            <a:chExt cx="6294665" cy="1296475"/>
+          </a:xfrm>
+        </p:grpSpPr>
+        <p:grpSp>
+          <p:nvGrpSpPr>
+            <p:cNvPr id="32" name="Group 31"/>
+            <p:cNvGrpSpPr/>
+            <p:nvPr/>
+          </p:nvGrpSpPr>
+          <p:grpSpPr>
+            <a:xfrm>
+              <a:off x="4171949" y="3088664"/>
+              <a:ext cx="6294665" cy="1296475"/>
+              <a:chOff x="3517639" y="3350559"/>
+              <a:chExt cx="5164953" cy="932687"/>
+            </a:xfrm>
+          </p:grpSpPr>
+          <p:sp>
+            <p:nvSpPr>
+              <p:cNvPr id="27" name="Pentagon 26"/>
+              <p:cNvSpPr/>
+              <p:nvPr/>
+            </p:nvSpPr>
+            <p:spPr>
+              <a:xfrm rot="5400000">
+                <a:off x="5633772" y="1234426"/>
+                <a:ext cx="932687" cy="5164953"/>
+              </a:xfrm>
+              <a:prstGeom prst="homePlate">
+                <a:avLst>
+                  <a:gd name="adj" fmla="val 30609"/>
+                </a:avLst>
+              </a:prstGeom>
+              <a:solidFill>
+                <a:schemeClr val="bg2">
+                  <a:lumMod val="75000"/>
+                </a:schemeClr>
+              </a:solidFill>
+              <a:ln>
+                <a:noFill/>
+              </a:ln>
+            </p:spPr>
+            <p:style>
+              <a:lnRef idx="2">
+                <a:schemeClr val="accent1">
+                  <a:shade val="50000"/>
+                </a:schemeClr>
+              </a:lnRef>
+              <a:fillRef idx="1">
+                <a:schemeClr val="accent1"/>
+              </a:fillRef>
+              <a:effectRef idx="0">
+                <a:schemeClr val="accent1"/>
+              </a:effectRef>
+              <a:fontRef idx="minor">
+                <a:schemeClr val="lt1"/>
+              </a:fontRef>
+            </p:style>
+            <p:txBody>
+              <a:bodyPr rtlCol="0" anchor="ctr"/>
+              <a:lstStyle/>
+              <a:p>
+                <a:pPr algn="ctr"/>
+                <a:endParaRPr lang="en-US" sz="1600" dirty="0">
+                  <a:solidFill>
+                    <a:schemeClr val="bg1"/>
+                  </a:solidFill>
+                  <a:latin typeface="Galvji" panose="020B0504020202020204" pitchFamily="34" charset="0"/>
+                  <a:cs typeface="Arial" panose="020B0604020202020204" pitchFamily="34" charset="0"/>
+                </a:endParaRPr>
+              </a:p>
+            </p:txBody>
+          </p:sp>
+          <p:sp>
+            <p:nvSpPr>
+              <p:cNvPr id="28" name="TextBox 27"/>
+              <p:cNvSpPr txBox="1"/>
+              <p:nvPr/>
+            </p:nvSpPr>
+            <p:spPr>
+              <a:xfrm>
+                <a:off x="3573642" y="3452112"/>
+                <a:ext cx="2408992" cy="243557"/>
+              </a:xfrm>
+              <a:prstGeom prst="rect">
+                <a:avLst/>
+              </a:prstGeom>
+              <a:noFill/>
+            </p:spPr>
+            <p:txBody>
+              <a:bodyPr wrap="none" rtlCol="0">
+                <a:spAutoFit/>
+              </a:bodyPr>
+              <a:lstStyle/>
+              <a:p>
+                <a:pPr>
+                  <a:spcAft>
+                    <a:spcPts val="600"/>
+                  </a:spcAft>
+                </a:pPr>
+                <a:r>
+                  <a:rPr lang="en-US" sz="1600" dirty="0" smtClean="0">
+                    <a:solidFill>
+                      <a:schemeClr val="bg1"/>
+                    </a:solidFill>
+                    <a:latin typeface="Galvji" panose="020B0504020202020204" pitchFamily="34" charset="0"/>
+                    <a:cs typeface="Arial" panose="020B0604020202020204" pitchFamily="34" charset="0"/>
+                  </a:rPr>
+                  <a:t>1. reduce </a:t>
+                </a:r>
+                <a:r>
+                  <a:rPr lang="en-US" sz="1600" dirty="0">
+                    <a:solidFill>
+                      <a:schemeClr val="bg1"/>
+                    </a:solidFill>
+                    <a:latin typeface="Galvji" panose="020B0504020202020204" pitchFamily="34" charset="0"/>
+                    <a:cs typeface="Arial" panose="020B0604020202020204" pitchFamily="34" charset="0"/>
+                  </a:rPr>
+                  <a:t>dataset </a:t>
+                </a:r>
+                <a:r>
+                  <a:rPr lang="en-US" sz="1600" dirty="0" smtClean="0">
+                    <a:solidFill>
+                      <a:schemeClr val="bg1"/>
+                    </a:solidFill>
+                    <a:latin typeface="Galvji" panose="020B0504020202020204" pitchFamily="34" charset="0"/>
+                    <a:cs typeface="Arial" panose="020B0604020202020204" pitchFamily="34" charset="0"/>
+                  </a:rPr>
+                  <a:t>size</a:t>
+                </a:r>
+                <a:endParaRPr lang="en-US" sz="1600" dirty="0">
+                  <a:solidFill>
+                    <a:schemeClr val="bg1"/>
+                  </a:solidFill>
+                  <a:latin typeface="Galvji" panose="020B0504020202020204" pitchFamily="34" charset="0"/>
+                  <a:cs typeface="Arial" panose="020B0604020202020204" pitchFamily="34" charset="0"/>
+                </a:endParaRPr>
+              </a:p>
+            </p:txBody>
+          </p:sp>
+          <p:sp>
+            <p:nvSpPr>
+              <p:cNvPr id="29" name="TextBox 28"/>
+              <p:cNvSpPr txBox="1"/>
+              <p:nvPr/>
+            </p:nvSpPr>
+            <p:spPr>
+              <a:xfrm>
+                <a:off x="3584636" y="3737023"/>
+                <a:ext cx="2308766" cy="243557"/>
+              </a:xfrm>
+              <a:prstGeom prst="rect">
+                <a:avLst/>
+              </a:prstGeom>
+              <a:noFill/>
+            </p:spPr>
+            <p:txBody>
+              <a:bodyPr wrap="none" rtlCol="0">
+                <a:spAutoFit/>
+              </a:bodyPr>
+              <a:lstStyle/>
+              <a:p>
+                <a:pPr>
+                  <a:spcAft>
+                    <a:spcPts val="600"/>
+                  </a:spcAft>
+                </a:pPr>
+                <a:r>
+                  <a:rPr lang="en-US" sz="1600" dirty="0" smtClean="0">
+                    <a:solidFill>
+                      <a:schemeClr val="bg1"/>
+                    </a:solidFill>
+                    <a:latin typeface="Galvji" panose="020B0504020202020204" pitchFamily="34" charset="0"/>
+                    <a:cs typeface="Arial" panose="020B0604020202020204" pitchFamily="34" charset="0"/>
+                  </a:rPr>
+                  <a:t>2. remove </a:t>
+                </a:r>
+                <a:r>
+                  <a:rPr lang="en-US" sz="1600" dirty="0" smtClean="0">
+                    <a:solidFill>
+                      <a:schemeClr val="bg1"/>
+                    </a:solidFill>
+                    <a:latin typeface="Galvji" panose="020B0504020202020204" pitchFamily="34" charset="0"/>
+                    <a:cs typeface="Arial" panose="020B0604020202020204" pitchFamily="34" charset="0"/>
+                  </a:rPr>
+                  <a:t>predictors</a:t>
+                </a:r>
+                <a:endParaRPr lang="en-US" sz="1600" dirty="0">
+                  <a:solidFill>
+                    <a:schemeClr val="bg1"/>
+                  </a:solidFill>
+                  <a:latin typeface="Galvji" panose="020B0504020202020204" pitchFamily="34" charset="0"/>
+                  <a:cs typeface="Arial" panose="020B0604020202020204" pitchFamily="34" charset="0"/>
+                </a:endParaRPr>
+              </a:p>
+            </p:txBody>
+          </p:sp>
+          <p:sp>
+            <p:nvSpPr>
+              <p:cNvPr id="30" name="TextBox 29"/>
+              <p:cNvSpPr txBox="1"/>
+              <p:nvPr/>
+            </p:nvSpPr>
+            <p:spPr>
+              <a:xfrm>
+                <a:off x="5690346" y="3458409"/>
+                <a:ext cx="2740387" cy="243557"/>
+              </a:xfrm>
+              <a:prstGeom prst="rect">
+                <a:avLst/>
+              </a:prstGeom>
+              <a:noFill/>
+            </p:spPr>
+            <p:txBody>
+              <a:bodyPr wrap="none" rtlCol="0">
+                <a:spAutoFit/>
+              </a:bodyPr>
+              <a:lstStyle/>
+              <a:p>
+                <a:pPr>
+                  <a:spcAft>
+                    <a:spcPts val="600"/>
+                  </a:spcAft>
+                </a:pPr>
+                <a:r>
+                  <a:rPr lang="en-US" sz="1600" dirty="0" smtClean="0">
+                    <a:solidFill>
+                      <a:schemeClr val="bg1"/>
+                    </a:solidFill>
+                    <a:latin typeface="Galvji" panose="020B0504020202020204" pitchFamily="34" charset="0"/>
+                    <a:cs typeface="Arial" panose="020B0604020202020204" pitchFamily="34" charset="0"/>
+                  </a:rPr>
+                  <a:t>3. add </a:t>
+                </a:r>
+                <a:r>
+                  <a:rPr lang="en-US" sz="1600" dirty="0">
+                    <a:solidFill>
+                      <a:schemeClr val="bg1"/>
+                    </a:solidFill>
+                    <a:latin typeface="Galvji" panose="020B0504020202020204" pitchFamily="34" charset="0"/>
+                    <a:cs typeface="Arial" panose="020B0604020202020204" pitchFamily="34" charset="0"/>
+                  </a:rPr>
+                  <a:t>noise on predictor</a:t>
+                </a:r>
+              </a:p>
+            </p:txBody>
+          </p:sp>
+        </p:grpSp>
+        <p:sp>
+          <p:nvSpPr>
+            <p:cNvPr id="33" name="TextBox 32"/>
+            <p:cNvSpPr txBox="1"/>
+            <p:nvPr/>
+          </p:nvSpPr>
+          <p:spPr>
+            <a:xfrm>
+              <a:off x="6819885" y="3621644"/>
+              <a:ext cx="3581430" cy="338554"/>
+            </a:xfrm>
+            <a:prstGeom prst="rect">
+              <a:avLst/>
+            </a:prstGeom>
+            <a:noFill/>
+          </p:spPr>
+          <p:txBody>
+            <a:bodyPr wrap="none" rtlCol="0">
+              <a:spAutoFit/>
+            </a:bodyPr>
+            <a:lstStyle/>
+            <a:p>
+              <a:pPr>
+                <a:spcAft>
+                  <a:spcPts val="600"/>
+                </a:spcAft>
+              </a:pPr>
+              <a:r>
+                <a:rPr lang="en-US" sz="1600" dirty="0" smtClean="0">
+                  <a:solidFill>
+                    <a:schemeClr val="bg1"/>
+                  </a:solidFill>
+                  <a:latin typeface="Galvji" panose="020B0504020202020204" pitchFamily="34" charset="0"/>
+                  <a:cs typeface="Arial" panose="020B0604020202020204" pitchFamily="34" charset="0"/>
+                </a:rPr>
+                <a:t>4. add </a:t>
+              </a:r>
+              <a:r>
+                <a:rPr lang="en-US" sz="1600" dirty="0">
+                  <a:solidFill>
+                    <a:schemeClr val="bg1"/>
+                  </a:solidFill>
+                  <a:latin typeface="Galvji" panose="020B0504020202020204" pitchFamily="34" charset="0"/>
+                  <a:cs typeface="Arial" panose="020B0604020202020204" pitchFamily="34" charset="0"/>
+                </a:rPr>
+                <a:t>noise on </a:t>
+              </a:r>
+              <a:r>
+                <a:rPr lang="en-US" sz="1600" dirty="0" smtClean="0">
+                  <a:solidFill>
+                    <a:schemeClr val="bg1"/>
+                  </a:solidFill>
+                  <a:latin typeface="Galvji" panose="020B0504020202020204" pitchFamily="34" charset="0"/>
+                  <a:cs typeface="Arial" panose="020B0604020202020204" pitchFamily="34" charset="0"/>
+                </a:rPr>
+                <a:t>response variable</a:t>
+              </a:r>
+              <a:endParaRPr lang="en-US" sz="1600" dirty="0">
+                <a:solidFill>
+                  <a:schemeClr val="bg1"/>
+                </a:solidFill>
+                <a:latin typeface="Galvji" panose="020B0504020202020204" pitchFamily="34" charset="0"/>
+                <a:cs typeface="Arial" panose="020B0604020202020204" pitchFamily="34" charset="0"/>
+              </a:endParaRPr>
+            </a:p>
+          </p:txBody>
+        </p:sp>
+      </p:grpSp>
+    </p:spTree>
+    <p:extLst>
+      <p:ext uri="{BB962C8B-B14F-4D97-AF65-F5344CB8AC3E}">
+        <p14:creationId xmlns:p14="http://schemas.microsoft.com/office/powerpoint/2010/main" val="720759238"/>
+      </p:ext>
+    </p:extLst>
+  </p:cSld>
+  <p:clrMapOvr>
+    <a:masterClrMapping/>
+  </p:clrMapOvr>
+  <p:timing>
+    <p:tnLst>
+      <p:par>
+        <p:cTn id="1" dur="indefinite" restart="never" nodeType="tmRoot">
+          <p:childTnLst>
+            <p:seq concurrent="1" nextAc="seek">
+              <p:cTn id="2" dur="indefinite" nodeType="mainSeq">
+                <p:childTnLst>
+                  <p:par>
+                    <p:cTn id="3" fill="hold">
+                      <p:stCondLst>
+                        <p:cond delay="indefinite"/>
+                      </p:stCondLst>
+                      <p:childTnLst>
+                        <p:par>
+                          <p:cTn id="4" fill="hold">
+                            <p:stCondLst>
+                              <p:cond delay="0"/>
+                            </p:stCondLst>
+                            <p:childTnLst>
+                              <p:par>
+                                <p:cTn id="5" presetID="1" presetClass="entr" presetSubtype="0" fill="hold" nodeType="clickEffect">
+                                  <p:stCondLst>
+                                    <p:cond delay="0"/>
+                                  </p:stCondLst>
+                                  <p:childTnLst>
+                                    <p:set>
+                                      <p:cBhvr>
+                                        <p:cTn id="6" dur="1" fill="hold">
+                                          <p:stCondLst>
+                                            <p:cond delay="0"/>
+                                          </p:stCondLst>
+                                        </p:cTn>
+                                        <p:tgtEl>
+                                          <p:spTgt spid="42"/>
+                                        </p:tgtEl>
+                                        <p:attrNameLst>
+                                          <p:attrName>style.visibility</p:attrName>
+                                        </p:attrNameLst>
+                                      </p:cBhvr>
+                                      <p:to>
+                                        <p:strVal val="visible"/>
+                                      </p:to>
+                                    </p:set>
+                                  </p:childTnLst>
+                                </p:cTn>
+                              </p:par>
+                            </p:childTnLst>
+                          </p:cTn>
+                        </p:par>
+                      </p:childTnLst>
+                    </p:cTn>
+                  </p:par>
+                  <p:par>
+                    <p:cTn id="7" fill="hold">
+                      <p:stCondLst>
+                        <p:cond delay="indefinite"/>
+                      </p:stCondLst>
+                      <p:childTnLst>
+                        <p:par>
+                          <p:cTn id="8" fill="hold">
+                            <p:stCondLst>
+                              <p:cond delay="0"/>
+                            </p:stCondLst>
+                            <p:childTnLst>
+                              <p:par>
+                                <p:cTn id="9" presetID="1" presetClass="entr" presetSubtype="0" fill="hold" nodeType="clickEffect">
+                                  <p:stCondLst>
+                                    <p:cond delay="0"/>
+                                  </p:stCondLst>
+                                  <p:childTnLst>
+                                    <p:set>
+                                      <p:cBhvr>
+                                        <p:cTn id="10" dur="1" fill="hold">
+                                          <p:stCondLst>
+                                            <p:cond delay="0"/>
+                                          </p:stCondLst>
+                                        </p:cTn>
+                                        <p:tgtEl>
+                                          <p:spTgt spid="45"/>
+                                        </p:tgtEl>
+                                        <p:attrNameLst>
+                                          <p:attrName>style.visibility</p:attrName>
+                                        </p:attrNameLst>
+                                      </p:cBhvr>
+                                      <p:to>
+                                        <p:strVal val="visible"/>
+                                      </p:to>
+                                    </p:set>
+                                  </p:childTnLst>
+                                </p:cTn>
+                              </p:par>
+                            </p:childTnLst>
+                          </p:cTn>
+                        </p:par>
+                      </p:childTnLst>
+                    </p:cTn>
+                  </p:par>
+                </p:childTnLst>
+              </p:cTn>
+              <p:prevCondLst>
+                <p:cond evt="onPrev" delay="0">
+                  <p:tgtEl>
+                    <p:sldTgt/>
+                  </p:tgtEl>
+                </p:cond>
+              </p:prevCondLst>
+              <p:nextCondLst>
+                <p:cond evt="onNext" delay="0">
+                  <p:tgtEl>
+                    <p:sldTgt/>
+                  </p:tgtEl>
+                </p:cond>
+              </p:nextCondLst>
+            </p:seq>
+          </p:childTnLst>
+        </p:cTn>
+      </p:par>
+    </p:tnLst>
+  </p:timing>
+</p:sld>
+</file>
+
 <file path=ppt/theme/theme1.xml><?xml version="1.0" encoding="utf-8"?>
 <a:theme xmlns:a="http://schemas.openxmlformats.org/drawingml/2006/main" name="Office Theme">
   <a:themeElements>

</xml_diff>